<commit_message>
updated README and pwerpoint presentation
</commit_message>
<xml_diff>
--- a/Presentation.pptx
+++ b/Presentation.pptx
@@ -7,7 +7,7 @@
   <p:sldIdLst>
     <p:sldId id="256" r:id="rId2"/>
     <p:sldId id="257" r:id="rId3"/>
-    <p:sldId id="258" r:id="rId4"/>
+    <p:sldId id="270" r:id="rId4"/>
     <p:sldId id="268" r:id="rId5"/>
     <p:sldId id="269" r:id="rId6"/>
     <p:sldId id="259" r:id="rId7"/>
@@ -111,6 +111,11 @@
       </a:defRPr>
     </a:lvl9pPr>
   </p:defaultTextStyle>
+  <p:extLst>
+    <p:ext uri="{EFAFB233-063F-42B5-8137-9DF3F51BA10A}">
+      <p15:sldGuideLst xmlns:p15="http://schemas.microsoft.com/office/powerpoint/2012/main"/>
+    </p:ext>
+  </p:extLst>
 </p:presentation>
 </file>
 
@@ -445,7 +450,7 @@
           <a:p>
             <a:fld id="{C6551D90-F5A3-4B4B-90F6-E2708D62CC46}" type="datetimeFigureOut">
               <a:rPr lang="LID4096" smtClean="0"/>
-              <a:t>03/10/2023</a:t>
+              <a:t>03/11/2023</a:t>
             </a:fld>
             <a:endParaRPr lang="LID4096"/>
           </a:p>
@@ -769,7 +774,7 @@
           <a:p>
             <a:fld id="{C6551D90-F5A3-4B4B-90F6-E2708D62CC46}" type="datetimeFigureOut">
               <a:rPr lang="LID4096" smtClean="0"/>
-              <a:t>03/10/2023</a:t>
+              <a:t>03/11/2023</a:t>
             </a:fld>
             <a:endParaRPr lang="LID4096"/>
           </a:p>
@@ -1017,7 +1022,7 @@
           <a:p>
             <a:fld id="{C6551D90-F5A3-4B4B-90F6-E2708D62CC46}" type="datetimeFigureOut">
               <a:rPr lang="LID4096" smtClean="0"/>
-              <a:t>03/10/2023</a:t>
+              <a:t>03/11/2023</a:t>
             </a:fld>
             <a:endParaRPr lang="LID4096"/>
           </a:p>
@@ -1356,7 +1361,7 @@
           <a:p>
             <a:fld id="{C6551D90-F5A3-4B4B-90F6-E2708D62CC46}" type="datetimeFigureOut">
               <a:rPr lang="LID4096" smtClean="0"/>
-              <a:t>03/10/2023</a:t>
+              <a:t>03/11/2023</a:t>
             </a:fld>
             <a:endParaRPr lang="LID4096"/>
           </a:p>
@@ -1703,7 +1708,7 @@
           <a:p>
             <a:fld id="{C6551D90-F5A3-4B4B-90F6-E2708D62CC46}" type="datetimeFigureOut">
               <a:rPr lang="LID4096" smtClean="0"/>
-              <a:t>03/10/2023</a:t>
+              <a:t>03/11/2023</a:t>
             </a:fld>
             <a:endParaRPr lang="LID4096"/>
           </a:p>
@@ -2077,7 +2082,7 @@
           <a:p>
             <a:fld id="{C6551D90-F5A3-4B4B-90F6-E2708D62CC46}" type="datetimeFigureOut">
               <a:rPr lang="LID4096" smtClean="0"/>
-              <a:t>03/10/2023</a:t>
+              <a:t>03/11/2023</a:t>
             </a:fld>
             <a:endParaRPr lang="LID4096"/>
           </a:p>
@@ -2547,7 +2552,7 @@
           <a:p>
             <a:fld id="{C6551D90-F5A3-4B4B-90F6-E2708D62CC46}" type="datetimeFigureOut">
               <a:rPr lang="LID4096" smtClean="0"/>
-              <a:t>03/10/2023</a:t>
+              <a:t>03/11/2023</a:t>
             </a:fld>
             <a:endParaRPr lang="LID4096"/>
           </a:p>
@@ -2752,7 +2757,7 @@
           <a:p>
             <a:fld id="{C6551D90-F5A3-4B4B-90F6-E2708D62CC46}" type="datetimeFigureOut">
               <a:rPr lang="LID4096" smtClean="0"/>
-              <a:t>03/10/2023</a:t>
+              <a:t>03/11/2023</a:t>
             </a:fld>
             <a:endParaRPr lang="LID4096"/>
           </a:p>
@@ -2963,7 +2968,7 @@
           <a:p>
             <a:fld id="{C6551D90-F5A3-4B4B-90F6-E2708D62CC46}" type="datetimeFigureOut">
               <a:rPr lang="LID4096" smtClean="0"/>
-              <a:t>03/10/2023</a:t>
+              <a:t>03/11/2023</a:t>
             </a:fld>
             <a:endParaRPr lang="LID4096"/>
           </a:p>
@@ -3195,7 +3200,7 @@
           <a:p>
             <a:fld id="{C6551D90-F5A3-4B4B-90F6-E2708D62CC46}" type="datetimeFigureOut">
               <a:rPr lang="LID4096" smtClean="0"/>
-              <a:t>03/10/2023</a:t>
+              <a:t>03/11/2023</a:t>
             </a:fld>
             <a:endParaRPr lang="LID4096"/>
           </a:p>
@@ -3443,7 +3448,7 @@
           <a:p>
             <a:fld id="{C6551D90-F5A3-4B4B-90F6-E2708D62CC46}" type="datetimeFigureOut">
               <a:rPr lang="LID4096" smtClean="0"/>
-              <a:t>03/10/2023</a:t>
+              <a:t>03/11/2023</a:t>
             </a:fld>
             <a:endParaRPr lang="LID4096"/>
           </a:p>
@@ -3741,7 +3746,7 @@
           <a:p>
             <a:fld id="{C6551D90-F5A3-4B4B-90F6-E2708D62CC46}" type="datetimeFigureOut">
               <a:rPr lang="LID4096" smtClean="0"/>
-              <a:t>03/10/2023</a:t>
+              <a:t>03/11/2023</a:t>
             </a:fld>
             <a:endParaRPr lang="LID4096"/>
           </a:p>
@@ -4135,7 +4140,7 @@
           <a:p>
             <a:fld id="{C6551D90-F5A3-4B4B-90F6-E2708D62CC46}" type="datetimeFigureOut">
               <a:rPr lang="LID4096" smtClean="0"/>
-              <a:t>03/10/2023</a:t>
+              <a:t>03/11/2023</a:t>
             </a:fld>
             <a:endParaRPr lang="LID4096"/>
           </a:p>
@@ -4284,7 +4289,7 @@
           <a:p>
             <a:fld id="{C6551D90-F5A3-4B4B-90F6-E2708D62CC46}" type="datetimeFigureOut">
               <a:rPr lang="LID4096" smtClean="0"/>
-              <a:t>03/10/2023</a:t>
+              <a:t>03/11/2023</a:t>
             </a:fld>
             <a:endParaRPr lang="LID4096"/>
           </a:p>
@@ -4410,7 +4415,7 @@
           <a:p>
             <a:fld id="{C6551D90-F5A3-4B4B-90F6-E2708D62CC46}" type="datetimeFigureOut">
               <a:rPr lang="LID4096" smtClean="0"/>
-              <a:t>03/10/2023</a:t>
+              <a:t>03/11/2023</a:t>
             </a:fld>
             <a:endParaRPr lang="LID4096"/>
           </a:p>
@@ -4665,7 +4670,7 @@
           <a:p>
             <a:fld id="{C6551D90-F5A3-4B4B-90F6-E2708D62CC46}" type="datetimeFigureOut">
               <a:rPr lang="LID4096" smtClean="0"/>
-              <a:t>03/10/2023</a:t>
+              <a:t>03/11/2023</a:t>
             </a:fld>
             <a:endParaRPr lang="LID4096"/>
           </a:p>
@@ -4980,7 +4985,7 @@
           <a:p>
             <a:fld id="{C6551D90-F5A3-4B4B-90F6-E2708D62CC46}" type="datetimeFigureOut">
               <a:rPr lang="LID4096" smtClean="0"/>
-              <a:t>03/10/2023</a:t>
+              <a:t>03/11/2023</a:t>
             </a:fld>
             <a:endParaRPr lang="LID4096"/>
           </a:p>
@@ -5331,7 +5336,7 @@
           <a:p>
             <a:fld id="{C6551D90-F5A3-4B4B-90F6-E2708D62CC46}" type="datetimeFigureOut">
               <a:rPr lang="LID4096" smtClean="0"/>
-              <a:t>03/10/2023</a:t>
+              <a:t>03/11/2023</a:t>
             </a:fld>
             <a:endParaRPr lang="LID4096"/>
           </a:p>
@@ -6187,9 +6192,10 @@
   <p:cSld>
     <p:bg>
       <p:bgPr>
-        <a:solidFill>
-          <a:schemeClr val="bg1"/>
-        </a:solidFill>
+        <a:blipFill>
+          <a:blip r:embed="rId2"/>
+          <a:stretch/>
+        </a:blipFill>
         <a:effectLst/>
       </p:bgPr>
     </p:bg>
@@ -6207,12 +6213,12 @@
           <a:chExt cx="0" cy="0"/>
         </a:xfrm>
       </p:grpSpPr>
-      <p:sp>
-        <p:nvSpPr>
-          <p:cNvPr id="9" name="Rectangle 8">
+      <p:sp useBgFill="1">
+        <p:nvSpPr>
+          <p:cNvPr id="24" name="Rectangle 23">
             <a:extLst>
               <a:ext uri="{FF2B5EF4-FFF2-40B4-BE49-F238E27FC236}">
-                <a16:creationId xmlns:a16="http://schemas.microsoft.com/office/drawing/2014/main" id="{5EB8E3BF-F464-4900-8994-851061A9AD60}"/>
+                <a16:creationId xmlns:a16="http://schemas.microsoft.com/office/drawing/2014/main" id="{D12B819D-CC31-407E-85A4-38D86944A0BD}"/>
               </a:ext>
               <a:ext uri="{C183D7F6-B498-43B3-948B-1728B52AA6E4}">
                 <adec:decorative xmlns:adec="http://schemas.microsoft.com/office/drawing/2017/decorative" val="1"/>
@@ -6238,9 +6244,6 @@
           <a:prstGeom prst="rect">
             <a:avLst/>
           </a:prstGeom>
-          <a:solidFill>
-            <a:srgbClr val="000000"/>
-          </a:solidFill>
           <a:ln>
             <a:noFill/>
           </a:ln>
@@ -6270,43 +6273,149 @@
           </a:p>
         </p:txBody>
       </p:sp>
-      <p:pic>
-        <p:nvPicPr>
-          <p:cNvPr id="5" name="Picture 4">
+      <p:sp>
+        <p:nvSpPr>
+          <p:cNvPr id="26" name="Rectangle 25">
             <a:extLst>
               <a:ext uri="{FF2B5EF4-FFF2-40B4-BE49-F238E27FC236}">
-                <a16:creationId xmlns:a16="http://schemas.microsoft.com/office/drawing/2014/main" id="{5FCA6406-EEA9-B6BA-5339-AD0C0B674AA1}"/>
+                <a16:creationId xmlns:a16="http://schemas.microsoft.com/office/drawing/2014/main" id="{1433B347-AE1B-487E-9813-FC88C0DD71A7}"/>
+              </a:ext>
+              <a:ext uri="{C183D7F6-B498-43B3-948B-1728B52AA6E4}">
+                <adec:decorative xmlns:adec="http://schemas.microsoft.com/office/drawing/2017/decorative" val="1"/>
               </a:ext>
             </a:extLst>
           </p:cNvPr>
-          <p:cNvPicPr>
-            <a:picLocks noChangeAspect="1"/>
-          </p:cNvPicPr>
-          <p:nvPr/>
-        </p:nvPicPr>
-        <p:blipFill rotWithShape="1">
-          <a:blip r:embed="rId2">
-            <a:alphaModFix amt="35000"/>
-          </a:blip>
-          <a:srcRect/>
-          <a:stretch/>
-        </p:blipFill>
-        <p:spPr>
-          <a:xfrm>
-            <a:off x="20" y="10"/>
-            <a:ext cx="12191980" cy="6857990"/>
+          <p:cNvSpPr>
+            <a:spLocks noGrp="1" noRot="1" noChangeAspect="1" noMove="1" noResize="1" noEditPoints="1" noAdjustHandles="1" noChangeArrowheads="1" noChangeShapeType="1" noTextEdit="1"/>
+          </p:cNvSpPr>
+          <p:nvPr>
+            <p:extLst>
+              <p:ext uri="{386F3935-93C4-4BCD-93E2-E3B085C9AB24}">
+                <p16:designElem xmlns:p16="http://schemas.microsoft.com/office/powerpoint/2015/main" val="1"/>
+              </p:ext>
+            </p:extLst>
+          </p:nvPr>
+        </p:nvSpPr>
+        <p:spPr>
+          <a:xfrm>
+            <a:off x="474662" y="469900"/>
+            <a:ext cx="11239500" cy="5918200"/>
           </a:xfrm>
           <a:prstGeom prst="rect">
             <a:avLst/>
           </a:prstGeom>
-        </p:spPr>
-      </p:pic>
+          <a:solidFill>
+            <a:schemeClr val="tx2">
+              <a:lumMod val="90000"/>
+              <a:lumOff val="10000"/>
+            </a:schemeClr>
+          </a:solidFill>
+          <a:ln>
+            <a:noFill/>
+          </a:ln>
+          <a:effectLst>
+            <a:outerShdw blurRad="50800" dist="38100" dir="5400000" algn="t" rotWithShape="0">
+              <a:prstClr val="black">
+                <a:alpha val="40000"/>
+              </a:prstClr>
+            </a:outerShdw>
+          </a:effectLst>
+          <a:scene3d>
+            <a:camera prst="orthographicFront"/>
+            <a:lightRig rig="balanced" dir="t"/>
+          </a:scene3d>
+          <a:sp3d contourW="12700">
+            <a:bevelT w="6350" h="6350"/>
+            <a:contourClr>
+              <a:schemeClr val="tx2">
+                <a:lumMod val="75000"/>
+                <a:lumOff val="25000"/>
+              </a:schemeClr>
+            </a:contourClr>
+          </a:sp3d>
+        </p:spPr>
+        <p:style>
+          <a:lnRef idx="2">
+            <a:schemeClr val="accent1">
+              <a:shade val="50000"/>
+            </a:schemeClr>
+          </a:lnRef>
+          <a:fillRef idx="1">
+            <a:schemeClr val="accent1"/>
+          </a:fillRef>
+          <a:effectRef idx="0">
+            <a:schemeClr val="accent1"/>
+          </a:effectRef>
+          <a:fontRef idx="minor">
+            <a:schemeClr val="lt1"/>
+          </a:fontRef>
+        </p:style>
+        <p:txBody>
+          <a:bodyPr rtlCol="0" anchor="ctr"/>
+          <a:lstStyle/>
+          <a:p>
+            <a:pPr algn="ctr"/>
+            <a:endParaRPr lang="en-US"/>
+          </a:p>
+        </p:txBody>
+      </p:sp>
+      <p:sp>
+        <p:nvSpPr>
+          <p:cNvPr id="28" name="Rectangle 27">
+            <a:extLst>
+              <a:ext uri="{FF2B5EF4-FFF2-40B4-BE49-F238E27FC236}">
+                <a16:creationId xmlns:a16="http://schemas.microsoft.com/office/drawing/2014/main" id="{7FE02B2F-D95A-47B1-8DA1-163D342608C7}"/>
+              </a:ext>
+              <a:ext uri="{C183D7F6-B498-43B3-948B-1728B52AA6E4}">
+                <adec:decorative xmlns:adec="http://schemas.microsoft.com/office/drawing/2017/decorative" val="1"/>
+              </a:ext>
+            </a:extLst>
+          </p:cNvPr>
+          <p:cNvSpPr>
+            <a:spLocks noGrp="1" noRot="1" noChangeAspect="1" noMove="1" noResize="1" noEditPoints="1" noAdjustHandles="1" noChangeArrowheads="1" noChangeShapeType="1" noTextEdit="1"/>
+          </p:cNvSpPr>
+          <p:nvPr>
+            <p:extLst>
+              <p:ext uri="{386F3935-93C4-4BCD-93E2-E3B085C9AB24}">
+                <p16:designElem xmlns:p16="http://schemas.microsoft.com/office/powerpoint/2015/main" val="1"/>
+              </p:ext>
+            </p:extLst>
+          </p:nvPr>
+        </p:nvSpPr>
+        <p:spPr>
+          <a:xfrm>
+            <a:off x="608012" y="609600"/>
+            <a:ext cx="10972800" cy="5638800"/>
+          </a:xfrm>
+          <a:prstGeom prst="rect">
+            <a:avLst/>
+          </a:prstGeom>
+          <a:noFill/>
+          <a:ln w="15875" cap="flat">
+            <a:miter lim="800000"/>
+          </a:ln>
+        </p:spPr>
+        <p:style>
+          <a:lnRef idx="1">
+            <a:schemeClr val="accent1"/>
+          </a:lnRef>
+          <a:fillRef idx="3">
+            <a:schemeClr val="accent1"/>
+          </a:fillRef>
+          <a:effectRef idx="2">
+            <a:schemeClr val="accent1"/>
+          </a:effectRef>
+          <a:fontRef idx="minor">
+            <a:schemeClr val="lt1"/>
+          </a:fontRef>
+        </p:style>
+      </p:sp>
       <p:sp>
         <p:nvSpPr>
           <p:cNvPr id="2" name="Title 1">
             <a:extLst>
               <a:ext uri="{FF2B5EF4-FFF2-40B4-BE49-F238E27FC236}">
-                <a16:creationId xmlns:a16="http://schemas.microsoft.com/office/drawing/2014/main" id="{B428DA9D-CFCF-E3E4-5B86-F67D225F6F85}"/>
+                <a16:creationId xmlns:a16="http://schemas.microsoft.com/office/drawing/2014/main" id="{631DFC8A-1E7D-6908-0900-E239A43E695F}"/>
               </a:ext>
             </a:extLst>
           </p:cNvPr>
@@ -6332,14 +6441,14 @@
             <a:r>
               <a:rPr lang="en-US">
                 <a:solidFill>
-                  <a:srgbClr val="FFFFFF"/>
+                  <a:schemeClr val="bg1"/>
                 </a:solidFill>
               </a:rPr>
               <a:t>Data Exploration</a:t>
             </a:r>
             <a:endParaRPr lang="LID4096">
               <a:solidFill>
-                <a:srgbClr val="FFFFFF"/>
+                <a:schemeClr val="bg1"/>
               </a:solidFill>
             </a:endParaRPr>
           </a:p>
@@ -6347,10 +6456,10 @@
       </p:sp>
       <p:cxnSp>
         <p:nvCxnSpPr>
-          <p:cNvPr id="11" name="Straight Connector 10">
+          <p:cNvPr id="30" name="Straight Connector 29">
             <a:extLst>
               <a:ext uri="{FF2B5EF4-FFF2-40B4-BE49-F238E27FC236}">
-                <a16:creationId xmlns:a16="http://schemas.microsoft.com/office/drawing/2014/main" id="{8E0602D6-3A81-42F8-AE67-1BAAFC967CB0}"/>
+                <a16:creationId xmlns:a16="http://schemas.microsoft.com/office/drawing/2014/main" id="{ED867580-55A6-4E67-A38E-4D1E3D4FBAF3}"/>
               </a:ext>
               <a:ext uri="{C183D7F6-B498-43B3-948B-1728B52AA6E4}">
                 <adec:decorative xmlns:adec="http://schemas.microsoft.com/office/drawing/2017/decorative" val="1"/>
@@ -6370,15 +6479,15 @@
         </p:nvCxnSpPr>
         <p:spPr>
           <a:xfrm>
-            <a:off x="1524000" y="2421466"/>
-            <a:ext cx="9144000" cy="0"/>
+            <a:off x="1483042" y="2400639"/>
+            <a:ext cx="9273858" cy="0"/>
           </a:xfrm>
           <a:prstGeom prst="line">
             <a:avLst/>
           </a:prstGeom>
-          <a:ln w="15875">
+          <a:ln>
             <a:solidFill>
-              <a:srgbClr val="FFFFFF"/>
+              <a:schemeClr val="accent1"/>
             </a:solidFill>
           </a:ln>
         </p:spPr>
@@ -6399,10 +6508,10 @@
       </p:cxnSp>
       <p:sp>
         <p:nvSpPr>
-          <p:cNvPr id="3" name="Content Placeholder 2">
+          <p:cNvPr id="48" name="Content Placeholder 2">
             <a:extLst>
               <a:ext uri="{FF2B5EF4-FFF2-40B4-BE49-F238E27FC236}">
-                <a16:creationId xmlns:a16="http://schemas.microsoft.com/office/drawing/2014/main" id="{7E08096B-180E-F272-AB16-DB60B8D9475D}"/>
+                <a16:creationId xmlns:a16="http://schemas.microsoft.com/office/drawing/2014/main" id="{D1167A0E-7F1A-C8C6-05CB-55A9E81927CB}"/>
               </a:ext>
             </a:extLst>
           </p:cNvPr>
@@ -6431,67 +6540,60 @@
             <a:r>
               <a:rPr lang="en-US">
                 <a:solidFill>
-                  <a:srgbClr val="FFFFFF"/>
-                </a:solidFill>
-                <a:latin typeface="Times New Roman" panose="02020603050405020304" pitchFamily="18" charset="0"/>
-                <a:cs typeface="Times New Roman" panose="02020603050405020304" pitchFamily="18" charset="0"/>
+                  <a:schemeClr val="bg1"/>
+                </a:solidFill>
               </a:rPr>
-              <a:t>The data we used in this analysis was source from 3 datasets:</a:t>
-            </a:r>
-          </a:p>
-          <a:p>
-            <a:pPr>
-              <a:buFont typeface="Arial" panose="020B0604020202020204" pitchFamily="34" charset="0"/>
-              <a:buChar char="•"/>
+              <a:t>The data we used  in this analysis was sourced from 3 datasets:</a:t>
+            </a:r>
+          </a:p>
+          <a:p>
+            <a:pPr marL="0" indent="0">
+              <a:buNone/>
             </a:pPr>
+            <a:endParaRPr lang="en-US">
+              <a:solidFill>
+                <a:schemeClr val="bg1"/>
+              </a:solidFill>
+            </a:endParaRPr>
+          </a:p>
+          <a:p>
             <a:r>
               <a:rPr lang="en-US">
                 <a:solidFill>
-                  <a:srgbClr val="FFFFFF"/>
-                </a:solidFill>
-                <a:latin typeface="Times New Roman" panose="02020603050405020304" pitchFamily="18" charset="0"/>
-                <a:cs typeface="Times New Roman" panose="02020603050405020304" pitchFamily="18" charset="0"/>
+                  <a:schemeClr val="bg1"/>
+                </a:solidFill>
               </a:rPr>
-              <a:t>  bom</a:t>
-            </a:r>
-          </a:p>
-          <a:p>
-            <a:pPr>
-              <a:buFont typeface="Arial" panose="020B0604020202020204" pitchFamily="34" charset="0"/>
-              <a:buChar char="•"/>
+              <a:t>Box Office Mojo</a:t>
+            </a:r>
+          </a:p>
+          <a:p>
+            <a:r>
+              <a:rPr lang="en-US">
+                <a:solidFill>
+                  <a:schemeClr val="bg1"/>
+                </a:solidFill>
+              </a:rPr>
+              <a:t>IMDB</a:t>
+            </a:r>
+          </a:p>
+          <a:p>
+            <a:r>
+              <a:rPr lang="en-US">
+                <a:solidFill>
+                  <a:schemeClr val="bg1"/>
+                </a:solidFill>
+              </a:rPr>
+              <a:t>The Numbers</a:t>
+            </a:r>
+          </a:p>
+          <a:p>
+            <a:pPr marL="0" indent="0">
+              <a:buNone/>
             </a:pPr>
-            <a:r>
-              <a:rPr lang="en-US">
-                <a:solidFill>
-                  <a:srgbClr val="FFFFFF"/>
-                </a:solidFill>
-                <a:latin typeface="Times New Roman" panose="02020603050405020304" pitchFamily="18" charset="0"/>
-                <a:cs typeface="Times New Roman" panose="02020603050405020304" pitchFamily="18" charset="0"/>
-              </a:rPr>
-              <a:t>Movie budgets</a:t>
-            </a:r>
-          </a:p>
-          <a:p>
-            <a:pPr>
-              <a:buFont typeface="Arial" panose="020B0604020202020204" pitchFamily="34" charset="0"/>
-              <a:buChar char="•"/>
-            </a:pPr>
-            <a:r>
-              <a:rPr lang="en-US">
-                <a:solidFill>
-                  <a:srgbClr val="FFFFFF"/>
-                </a:solidFill>
-                <a:latin typeface="Times New Roman" panose="02020603050405020304" pitchFamily="18" charset="0"/>
-                <a:cs typeface="Times New Roman" panose="02020603050405020304" pitchFamily="18" charset="0"/>
-              </a:rPr>
-              <a:t>idmb</a:t>
-            </a:r>
-            <a:endParaRPr lang="LID4096" dirty="0">
+            <a:endParaRPr lang="LID4096">
               <a:solidFill>
-                <a:srgbClr val="FFFFFF"/>
+                <a:schemeClr val="bg1"/>
               </a:solidFill>
-              <a:latin typeface="Times New Roman" panose="02020603050405020304" pitchFamily="18" charset="0"/>
-              <a:cs typeface="Times New Roman" panose="02020603050405020304" pitchFamily="18" charset="0"/>
             </a:endParaRPr>
           </a:p>
         </p:txBody>
@@ -6499,12 +6601,12 @@
     </p:spTree>
     <p:extLst>
       <p:ext uri="{BB962C8B-B14F-4D97-AF65-F5344CB8AC3E}">
-        <p14:creationId xmlns:p14="http://schemas.microsoft.com/office/powerpoint/2010/main" val="3633957487"/>
+        <p14:creationId xmlns:p14="http://schemas.microsoft.com/office/powerpoint/2010/main" val="342448654"/>
       </p:ext>
     </p:extLst>
   </p:cSld>
   <p:clrMapOvr>
-    <a:overrideClrMapping bg1="dk1" tx1="lt1" bg2="dk2" tx2="lt2" accent1="accent1" accent2="accent2" accent3="accent3" accent4="accent4" accent5="accent5" accent6="accent6" hlink="hlink" folHlink="folHlink"/>
+    <a:masterClrMapping/>
   </p:clrMapOvr>
 </p:sld>
 </file>
@@ -6909,9 +7011,10 @@
   <p:cSld>
     <p:bg>
       <p:bgPr>
-        <a:solidFill>
-          <a:schemeClr val="bg1"/>
-        </a:solidFill>
+        <a:blipFill>
+          <a:blip r:embed="rId2"/>
+          <a:stretch/>
+        </a:blipFill>
         <a:effectLst/>
       </p:bgPr>
     </p:bg>
@@ -6931,7 +7034,7 @@
       </p:grpSpPr>
       <p:grpSp>
         <p:nvGrpSpPr>
-          <p:cNvPr id="10" name="Group 9">
+          <p:cNvPr id="47" name="Group 28">
             <a:extLst>
               <a:ext uri="{FF2B5EF4-FFF2-40B4-BE49-F238E27FC236}">
                 <a16:creationId xmlns:a16="http://schemas.microsoft.com/office/drawing/2014/main" id="{3F6D81C7-B083-478E-82FE-089A8CB72EB8}"/>
@@ -6962,7 +7065,7 @@
         </p:grpSpPr>
         <p:pic>
           <p:nvPicPr>
-            <p:cNvPr id="11" name="Picture 10">
+            <p:cNvPr id="30" name="Picture 29">
               <a:extLst>
                 <a:ext uri="{FF2B5EF4-FFF2-40B4-BE49-F238E27FC236}">
                   <a16:creationId xmlns:a16="http://schemas.microsoft.com/office/drawing/2014/main" id="{8398EDA2-4889-433D-AC01-5214D79764ED}"/>
@@ -6984,7 +7087,7 @@
             </p:nvPr>
           </p:nvPicPr>
           <p:blipFill>
-            <a:blip r:embed="rId2">
+            <a:blip r:embed="rId3">
               <a:extLst>
                 <a:ext uri="{28A0092B-C50C-407E-A947-70E740481C1C}">
                   <a14:useLocalDpi xmlns:a14="http://schemas.microsoft.com/office/drawing/2010/main" val="0"/>
@@ -7007,7 +7110,7 @@
         </p:pic>
         <p:sp>
           <p:nvSpPr>
-            <p:cNvPr id="12" name="Rectangle 11">
+            <p:cNvPr id="31" name="Rectangle 30">
               <a:extLst>
                 <a:ext uri="{FF2B5EF4-FFF2-40B4-BE49-F238E27FC236}">
                   <a16:creationId xmlns:a16="http://schemas.microsoft.com/office/drawing/2014/main" id="{0099D46A-AF52-46FD-938B-D31189460A2F}"/>
@@ -7056,7 +7159,7 @@
         </p:sp>
         <p:pic>
           <p:nvPicPr>
-            <p:cNvPr id="13" name="Picture 12">
+            <p:cNvPr id="32" name="Picture 31">
               <a:extLst>
                 <a:ext uri="{FF2B5EF4-FFF2-40B4-BE49-F238E27FC236}">
                   <a16:creationId xmlns:a16="http://schemas.microsoft.com/office/drawing/2014/main" id="{C933E919-C473-4F0E-9DBC-CC65FC9E926E}"/>
@@ -7078,7 +7181,7 @@
             </p:nvPr>
           </p:nvPicPr>
           <p:blipFill rotWithShape="1">
-            <a:blip r:embed="rId3">
+            <a:blip r:embed="rId4">
               <a:extLst>
                 <a:ext uri="{28A0092B-C50C-407E-A947-70E740481C1C}">
                   <a14:useLocalDpi xmlns:a14="http://schemas.microsoft.com/office/drawing/2010/main" val="0"/>
@@ -7100,7 +7203,7 @@
         </p:pic>
         <p:pic>
           <p:nvPicPr>
-            <p:cNvPr id="14" name="Picture 13">
+            <p:cNvPr id="33" name="Picture 32">
               <a:extLst>
                 <a:ext uri="{FF2B5EF4-FFF2-40B4-BE49-F238E27FC236}">
                   <a16:creationId xmlns:a16="http://schemas.microsoft.com/office/drawing/2014/main" id="{FBBF3BDD-5C99-4FDC-BBCB-E711359D93F6}"/>
@@ -7122,7 +7225,7 @@
             </p:nvPr>
           </p:nvPicPr>
           <p:blipFill rotWithShape="1">
-            <a:blip r:embed="rId3">
+            <a:blip r:embed="rId4">
               <a:extLst>
                 <a:ext uri="{28A0092B-C50C-407E-A947-70E740481C1C}">
                   <a14:useLocalDpi xmlns:a14="http://schemas.microsoft.com/office/drawing/2010/main" val="0"/>
@@ -7145,7 +7248,7 @@
       </p:grpSp>
       <p:cxnSp>
         <p:nvCxnSpPr>
-          <p:cNvPr id="16" name="Straight Connector 15">
+          <p:cNvPr id="48" name="Straight Connector 34">
             <a:extLst>
               <a:ext uri="{FF2B5EF4-FFF2-40B4-BE49-F238E27FC236}">
                 <a16:creationId xmlns:a16="http://schemas.microsoft.com/office/drawing/2014/main" id="{F06B54F2-CD11-4359-A7D6-DA7C76C091A6}"/>
@@ -7193,199 +7296,6 @@
       </p:cxnSp>
       <p:sp>
         <p:nvSpPr>
-          <p:cNvPr id="18" name="Rectangle 17">
-            <a:extLst>
-              <a:ext uri="{FF2B5EF4-FFF2-40B4-BE49-F238E27FC236}">
-                <a16:creationId xmlns:a16="http://schemas.microsoft.com/office/drawing/2014/main" id="{333F0879-3DA0-4CB8-B35E-A0AD42558191}"/>
-              </a:ext>
-              <a:ext uri="{C183D7F6-B498-43B3-948B-1728B52AA6E4}">
-                <adec:decorative xmlns:adec="http://schemas.microsoft.com/office/drawing/2017/decorative" val="1"/>
-              </a:ext>
-            </a:extLst>
-          </p:cNvPr>
-          <p:cNvSpPr>
-            <a:spLocks noGrp="1" noRot="1" noChangeAspect="1" noMove="1" noResize="1" noEditPoints="1" noAdjustHandles="1" noChangeArrowheads="1" noChangeShapeType="1" noTextEdit="1"/>
-          </p:cNvSpPr>
-          <p:nvPr>
-            <p:extLst>
-              <p:ext uri="{386F3935-93C4-4BCD-93E2-E3B085C9AB24}">
-                <p16:designElem xmlns:p16="http://schemas.microsoft.com/office/powerpoint/2015/main" val="1"/>
-              </p:ext>
-            </p:extLst>
-          </p:nvPr>
-        </p:nvSpPr>
-        <p:spPr>
-          <a:xfrm>
-            <a:off x="0" y="2"/>
-            <a:ext cx="12188952" cy="6858000"/>
-          </a:xfrm>
-          <a:prstGeom prst="rect">
-            <a:avLst/>
-          </a:prstGeom>
-          <a:ln>
-            <a:noFill/>
-          </a:ln>
-        </p:spPr>
-        <p:style>
-          <a:lnRef idx="2">
-            <a:schemeClr val="accent1">
-              <a:shade val="50000"/>
-            </a:schemeClr>
-          </a:lnRef>
-          <a:fillRef idx="1003">
-            <a:schemeClr val="lt1"/>
-          </a:fillRef>
-          <a:effectRef idx="0">
-            <a:schemeClr val="accent1"/>
-          </a:effectRef>
-          <a:fontRef idx="minor">
-            <a:schemeClr val="lt1"/>
-          </a:fontRef>
-        </p:style>
-        <p:txBody>
-          <a:bodyPr rtlCol="0" anchor="ctr"/>
-          <a:lstStyle/>
-          <a:p>
-            <a:pPr algn="ctr"/>
-            <a:endParaRPr lang="en-US"/>
-          </a:p>
-        </p:txBody>
-      </p:sp>
-      <p:sp>
-        <p:nvSpPr>
-          <p:cNvPr id="20" name="Rectangle 19">
-            <a:extLst>
-              <a:ext uri="{FF2B5EF4-FFF2-40B4-BE49-F238E27FC236}">
-                <a16:creationId xmlns:a16="http://schemas.microsoft.com/office/drawing/2014/main" id="{324D2183-F388-476E-92A9-D6639D698580}"/>
-              </a:ext>
-              <a:ext uri="{C183D7F6-B498-43B3-948B-1728B52AA6E4}">
-                <adec:decorative xmlns:adec="http://schemas.microsoft.com/office/drawing/2017/decorative" val="1"/>
-              </a:ext>
-            </a:extLst>
-          </p:cNvPr>
-          <p:cNvSpPr>
-            <a:spLocks noGrp="1" noRot="1" noChangeAspect="1" noMove="1" noResize="1" noEditPoints="1" noAdjustHandles="1" noChangeArrowheads="1" noChangeShapeType="1" noTextEdit="1"/>
-          </p:cNvSpPr>
-          <p:nvPr>
-            <p:extLst>
-              <p:ext uri="{386F3935-93C4-4BCD-93E2-E3B085C9AB24}">
-                <p16:designElem xmlns:p16="http://schemas.microsoft.com/office/powerpoint/2015/main" val="1"/>
-              </p:ext>
-            </p:extLst>
-          </p:nvPr>
-        </p:nvSpPr>
-        <p:spPr>
-          <a:xfrm>
-            <a:off x="486138" y="496090"/>
-            <a:ext cx="3823215" cy="5883295"/>
-          </a:xfrm>
-          <a:prstGeom prst="rect">
-            <a:avLst/>
-          </a:prstGeom>
-          <a:blipFill dpi="0" rotWithShape="1">
-            <a:blip r:embed="rId4"/>
-            <a:srcRect/>
-            <a:tile tx="0" ty="0" sx="100000" sy="100000" flip="none" algn="tl"/>
-          </a:blipFill>
-          <a:ln>
-            <a:noFill/>
-          </a:ln>
-          <a:effectLst>
-            <a:outerShdw blurRad="114300" dist="127000" dir="5400000" sx="99000" sy="99000" algn="t" rotWithShape="0">
-              <a:prstClr val="black">
-                <a:alpha val="40000"/>
-              </a:prstClr>
-            </a:outerShdw>
-          </a:effectLst>
-          <a:scene3d>
-            <a:camera prst="orthographicFront"/>
-            <a:lightRig rig="twoPt" dir="t"/>
-          </a:scene3d>
-          <a:sp3d contourW="6350">
-            <a:bevelT w="12700" h="0" prst="coolSlant"/>
-            <a:contourClr>
-              <a:schemeClr val="bg2"/>
-            </a:contourClr>
-          </a:sp3d>
-        </p:spPr>
-        <p:style>
-          <a:lnRef idx="2">
-            <a:schemeClr val="accent1">
-              <a:shade val="50000"/>
-            </a:schemeClr>
-          </a:lnRef>
-          <a:fillRef idx="1">
-            <a:schemeClr val="accent1"/>
-          </a:fillRef>
-          <a:effectRef idx="0">
-            <a:schemeClr val="accent1"/>
-          </a:effectRef>
-          <a:fontRef idx="minor">
-            <a:schemeClr val="lt1"/>
-          </a:fontRef>
-        </p:style>
-        <p:txBody>
-          <a:bodyPr rtlCol="0" anchor="ctr"/>
-          <a:lstStyle/>
-          <a:p>
-            <a:pPr algn="ctr"/>
-            <a:endParaRPr lang="en-US"/>
-          </a:p>
-        </p:txBody>
-      </p:sp>
-      <p:sp>
-        <p:nvSpPr>
-          <p:cNvPr id="22" name="Rectangle 21">
-            <a:extLst>
-              <a:ext uri="{FF2B5EF4-FFF2-40B4-BE49-F238E27FC236}">
-                <a16:creationId xmlns:a16="http://schemas.microsoft.com/office/drawing/2014/main" id="{243462E7-1698-4B21-BE89-AEFAC7C2FEFA}"/>
-              </a:ext>
-              <a:ext uri="{C183D7F6-B498-43B3-948B-1728B52AA6E4}">
-                <adec:decorative xmlns:adec="http://schemas.microsoft.com/office/drawing/2017/decorative" val="1"/>
-              </a:ext>
-            </a:extLst>
-          </p:cNvPr>
-          <p:cNvSpPr>
-            <a:spLocks noGrp="1" noRot="1" noChangeAspect="1" noMove="1" noResize="1" noEditPoints="1" noAdjustHandles="1" noChangeArrowheads="1" noChangeShapeType="1" noTextEdit="1"/>
-          </p:cNvSpPr>
-          <p:nvPr>
-            <p:extLst>
-              <p:ext uri="{386F3935-93C4-4BCD-93E2-E3B085C9AB24}">
-                <p16:designElem xmlns:p16="http://schemas.microsoft.com/office/powerpoint/2015/main" val="1"/>
-              </p:ext>
-            </p:extLst>
-          </p:nvPr>
-        </p:nvSpPr>
-        <p:spPr>
-          <a:xfrm>
-            <a:off x="608012" y="609602"/>
-            <a:ext cx="3552006" cy="5638800"/>
-          </a:xfrm>
-          <a:prstGeom prst="rect">
-            <a:avLst/>
-          </a:prstGeom>
-          <a:noFill/>
-          <a:ln w="15875" cap="flat">
-            <a:miter lim="800000"/>
-          </a:ln>
-        </p:spPr>
-        <p:style>
-          <a:lnRef idx="1">
-            <a:schemeClr val="accent1"/>
-          </a:lnRef>
-          <a:fillRef idx="3">
-            <a:schemeClr val="accent1"/>
-          </a:fillRef>
-          <a:effectRef idx="2">
-            <a:schemeClr val="accent1"/>
-          </a:effectRef>
-          <a:fontRef idx="minor">
-            <a:schemeClr val="lt1"/>
-          </a:fontRef>
-        </p:style>
-      </p:sp>
-      <p:sp>
-        <p:nvSpPr>
           <p:cNvPr id="2" name="Title 1">
             <a:extLst>
               <a:ext uri="{FF2B5EF4-FFF2-40B4-BE49-F238E27FC236}">
@@ -7402,23 +7312,18 @@
         </p:nvSpPr>
         <p:spPr>
           <a:xfrm>
-            <a:off x="929140" y="972766"/>
-            <a:ext cx="2835464" cy="1254868"/>
-          </a:xfrm>
-        </p:spPr>
-        <p:txBody>
-          <a:bodyPr vert="horz" lIns="91440" tIns="45720" rIns="91440" bIns="45720" rtlCol="0" anchor="b">
+            <a:off x="1295402" y="982132"/>
+            <a:ext cx="9601196" cy="1303867"/>
+          </a:xfrm>
+        </p:spPr>
+        <p:txBody>
+          <a:bodyPr vert="horz" lIns="91440" tIns="45720" rIns="91440" bIns="45720" rtlCol="0" anchor="ctr">
             <a:normAutofit/>
           </a:bodyPr>
           <a:lstStyle/>
           <a:p>
-            <a:pPr>
-              <a:lnSpc>
-                <a:spcPct val="90000"/>
-              </a:lnSpc>
-            </a:pPr>
-            <a:r>
-              <a:rPr lang="en-US" sz="2800">
+            <a:r>
+              <a:rPr lang="en-US">
                 <a:solidFill>
                   <a:srgbClr val="262626"/>
                 </a:solidFill>
@@ -7446,8 +7351,8 @@
         </p:nvSpPr>
         <p:spPr>
           <a:xfrm>
-            <a:off x="929141" y="2430471"/>
-            <a:ext cx="2835464" cy="3552039"/>
+            <a:off x="1295402" y="2556932"/>
+            <a:ext cx="6256866" cy="3318936"/>
           </a:xfrm>
         </p:spPr>
         <p:txBody>
@@ -7456,93 +7361,15 @@
           </a:bodyPr>
           <a:lstStyle/>
           <a:p>
-            <a:pPr marL="0" indent="0">
-              <a:buNone/>
-            </a:pPr>
-            <a:r>
-              <a:rPr lang="en-US" sz="1800" dirty="0">
+            <a:pPr marL="0" indent="0"/>
+            <a:r>
+              <a:rPr lang="en-US">
                 <a:solidFill>
                   <a:srgbClr val="262626"/>
                 </a:solidFill>
               </a:rPr>
-              <a:t>Microsoft Studios should consider </a:t>
-            </a:r>
-            <a:r>
-              <a:rPr lang="en-US" sz="1800" dirty="0" err="1">
-                <a:solidFill>
-                  <a:srgbClr val="262626"/>
-                </a:solidFill>
-              </a:rPr>
-              <a:t>patnering</a:t>
-            </a:r>
-            <a:r>
-              <a:rPr lang="en-US" sz="1800" dirty="0">
-                <a:solidFill>
-                  <a:srgbClr val="262626"/>
-                </a:solidFill>
-              </a:rPr>
-              <a:t> with BV studios as this would likely lead to the highest gross revenues from the movie.</a:t>
-            </a:r>
-          </a:p>
-        </p:txBody>
-      </p:sp>
-      <p:sp useBgFill="1">
-        <p:nvSpPr>
-          <p:cNvPr id="24" name="Rectangle 23">
-            <a:extLst>
-              <a:ext uri="{FF2B5EF4-FFF2-40B4-BE49-F238E27FC236}">
-                <a16:creationId xmlns:a16="http://schemas.microsoft.com/office/drawing/2014/main" id="{6C22FCAC-D7EC-4A52-B153-FF761E2235B3}"/>
-              </a:ext>
-              <a:ext uri="{C183D7F6-B498-43B3-948B-1728B52AA6E4}">
-                <adec:decorative xmlns:adec="http://schemas.microsoft.com/office/drawing/2017/decorative" val="1"/>
-              </a:ext>
-            </a:extLst>
-          </p:cNvPr>
-          <p:cNvSpPr>
-            <a:spLocks noGrp="1" noRot="1" noChangeAspect="1" noMove="1" noResize="1" noEditPoints="1" noAdjustHandles="1" noChangeArrowheads="1" noChangeShapeType="1" noTextEdit="1"/>
-          </p:cNvSpPr>
-          <p:nvPr>
-            <p:extLst>
-              <p:ext uri="{386F3935-93C4-4BCD-93E2-E3B085C9AB24}">
-                <p16:designElem xmlns:p16="http://schemas.microsoft.com/office/powerpoint/2015/main" val="1"/>
-              </p:ext>
-            </p:extLst>
-          </p:nvPr>
-        </p:nvSpPr>
-        <p:spPr>
-          <a:xfrm>
-            <a:off x="4795491" y="0"/>
-            <a:ext cx="7396509" cy="6858002"/>
-          </a:xfrm>
-          <a:prstGeom prst="rect">
-            <a:avLst/>
-          </a:prstGeom>
-          <a:ln>
-            <a:noFill/>
-          </a:ln>
-        </p:spPr>
-        <p:style>
-          <a:lnRef idx="2">
-            <a:schemeClr val="accent1">
-              <a:shade val="50000"/>
-            </a:schemeClr>
-          </a:lnRef>
-          <a:fillRef idx="1">
-            <a:schemeClr val="accent1"/>
-          </a:fillRef>
-          <a:effectRef idx="0">
-            <a:schemeClr val="accent1"/>
-          </a:effectRef>
-          <a:fontRef idx="minor">
-            <a:schemeClr val="lt1"/>
-          </a:fontRef>
-        </p:style>
-        <p:txBody>
-          <a:bodyPr rtlCol="0" anchor="ctr"/>
-          <a:lstStyle/>
-          <a:p>
-            <a:pPr algn="ctr"/>
-            <a:endParaRPr lang="en-US"/>
+              <a:t>Microsoft Studios should consider patnering with BV studios as this would likely lead to the highest gross revenues from the movie.</a:t>
+            </a:r>
           </a:p>
         </p:txBody>
       </p:sp>
@@ -7570,12 +7397,18 @@
         </p:blipFill>
         <p:spPr>
           <a:xfrm>
-            <a:off x="5435910" y="781319"/>
-            <a:ext cx="6098041" cy="5244314"/>
+            <a:off x="8085026" y="2949417"/>
+            <a:ext cx="2739728" cy="2356165"/>
           </a:xfrm>
           <a:prstGeom prst="rect">
             <a:avLst/>
           </a:prstGeom>
+          <a:ln w="57150" cmpd="thickThin">
+            <a:solidFill>
+              <a:srgbClr val="7F7F7F"/>
+            </a:solidFill>
+            <a:miter lim="800000"/>
+          </a:ln>
         </p:spPr>
       </p:pic>
     </p:spTree>

</xml_diff>

<commit_message>
updated README and Powerpoint Presentation
</commit_message>
<xml_diff>
--- a/Presentation.pptx
+++ b/Presentation.pptx
@@ -10,7 +10,7 @@
     <p:sldId id="270" r:id="rId4"/>
     <p:sldId id="268" r:id="rId5"/>
     <p:sldId id="269" r:id="rId6"/>
-    <p:sldId id="259" r:id="rId7"/>
+    <p:sldId id="271" r:id="rId7"/>
     <p:sldId id="263" r:id="rId8"/>
     <p:sldId id="267" r:id="rId9"/>
   </p:sldIdLst>
@@ -5933,10 +5933,7 @@
           <a:lstStyle/>
           <a:p>
             <a:r>
-              <a:rPr lang="en-US" sz="2000" b="1">
-                <a:solidFill>
-                  <a:srgbClr val="C00000"/>
-                </a:solidFill>
+              <a:rPr lang="en-US" sz="2000" b="1" dirty="0">
                 <a:latin typeface="Times New Roman" panose="02020603050405020304" pitchFamily="18" charset="0"/>
                 <a:cs typeface="Times New Roman" panose="02020603050405020304" pitchFamily="18" charset="0"/>
               </a:rPr>
@@ -5944,29 +5941,20 @@
             </a:r>
           </a:p>
           <a:p>
-            <a:endParaRPr lang="en-US" sz="2000" b="1">
-              <a:solidFill>
-                <a:srgbClr val="C00000"/>
-              </a:solidFill>
+            <a:endParaRPr lang="en-US" sz="2000" b="1" dirty="0">
               <a:latin typeface="Times New Roman" panose="02020603050405020304" pitchFamily="18" charset="0"/>
               <a:cs typeface="Times New Roman" panose="02020603050405020304" pitchFamily="18" charset="0"/>
             </a:endParaRPr>
           </a:p>
           <a:p>
             <a:r>
-              <a:rPr lang="en-US" sz="2000" b="1">
-                <a:solidFill>
-                  <a:srgbClr val="C00000"/>
-                </a:solidFill>
+              <a:rPr lang="en-US" sz="2000" b="1" dirty="0">
                 <a:latin typeface="Times New Roman" panose="02020603050405020304" pitchFamily="18" charset="0"/>
                 <a:cs typeface="Times New Roman" panose="02020603050405020304" pitchFamily="18" charset="0"/>
               </a:rPr>
               <a:t>12 - March - 2023 </a:t>
             </a:r>
             <a:endParaRPr lang="LID4096" sz="2000" b="1" dirty="0">
-              <a:solidFill>
-                <a:srgbClr val="C00000"/>
-              </a:solidFill>
               <a:latin typeface="Times New Roman" panose="02020603050405020304" pitchFamily="18" charset="0"/>
               <a:cs typeface="Times New Roman" panose="02020603050405020304" pitchFamily="18" charset="0"/>
             </a:endParaRPr>
@@ -6113,26 +6101,33 @@
           <a:lstStyle/>
           <a:p>
             <a:pPr marL="0" indent="0">
-              <a:lnSpc>
-                <a:spcPct val="90000"/>
-              </a:lnSpc>
               <a:buNone/>
             </a:pPr>
             <a:r>
-              <a:rPr lang="en-US" sz="2200" b="0" i="0">
-                <a:effectLst/>
-                <a:latin typeface="Helvetica Neue"/>
+              <a:rPr lang="en-US">
+                <a:latin typeface="Times New Roman" panose="02020603050405020304" pitchFamily="18" charset="0"/>
+                <a:cs typeface="Times New Roman" panose="02020603050405020304" pitchFamily="18" charset="0"/>
               </a:rPr>
-              <a:t>Microsoft sees all the big companies creating original video content and they want to get in on the fun. They have decided to create a new movie studio, but they don't know anything about creating movies. We are charged with exploring what types of films are currently doing the best at the box office. We must then translate those findings into actionable insights that the head of Microsoft's new studio can use to help decide what type of films to create.</a:t>
-            </a:r>
-          </a:p>
-          <a:p>
-            <a:pPr>
-              <a:lnSpc>
-                <a:spcPct val="90000"/>
-              </a:lnSpc>
+              <a:t>Microsoft intends to open a movie studio. Based on provided datasets, we explore what types of films are currently doing the best at the box office.</a:t>
+            </a:r>
+          </a:p>
+          <a:p>
+            <a:pPr marL="0" indent="0">
+              <a:buNone/>
             </a:pPr>
-            <a:endParaRPr lang="LID4096" sz="2200"/>
+            <a:r>
+              <a:rPr lang="en-US">
+                <a:latin typeface="Times New Roman" panose="02020603050405020304" pitchFamily="18" charset="0"/>
+                <a:cs typeface="Times New Roman" panose="02020603050405020304" pitchFamily="18" charset="0"/>
+              </a:rPr>
+              <a:t>With the analysis data, we then get some insights about movies that will help in decision  making to determine what films to create.</a:t>
+            </a:r>
+          </a:p>
+          <a:p>
+            <a:pPr marL="0" indent="0">
+              <a:buNone/>
+            </a:pPr>
+            <a:endParaRPr lang="LID4096"/>
           </a:p>
         </p:txBody>
       </p:sp>
@@ -6439,17 +6434,21 @@
           <a:lstStyle/>
           <a:p>
             <a:r>
-              <a:rPr lang="en-US">
+              <a:rPr lang="en-US" dirty="0">
                 <a:solidFill>
                   <a:schemeClr val="bg1"/>
                 </a:solidFill>
+                <a:latin typeface="Times New Roman" panose="02020603050405020304" pitchFamily="18" charset="0"/>
+                <a:cs typeface="Times New Roman" panose="02020603050405020304" pitchFamily="18" charset="0"/>
               </a:rPr>
               <a:t>Data Exploration</a:t>
             </a:r>
-            <a:endParaRPr lang="LID4096">
+            <a:endParaRPr lang="LID4096" dirty="0">
               <a:solidFill>
                 <a:schemeClr val="bg1"/>
               </a:solidFill>
+              <a:latin typeface="Times New Roman" panose="02020603050405020304" pitchFamily="18" charset="0"/>
+              <a:cs typeface="Times New Roman" panose="02020603050405020304" pitchFamily="18" charset="0"/>
             </a:endParaRPr>
           </a:p>
         </p:txBody>
@@ -6538,10 +6537,12 @@
               <a:buNone/>
             </a:pPr>
             <a:r>
-              <a:rPr lang="en-US">
+              <a:rPr lang="en-US" dirty="0">
                 <a:solidFill>
                   <a:schemeClr val="bg1"/>
                 </a:solidFill>
+                <a:latin typeface="Times New Roman" panose="02020603050405020304" pitchFamily="18" charset="0"/>
+                <a:cs typeface="Times New Roman" panose="02020603050405020304" pitchFamily="18" charset="0"/>
               </a:rPr>
               <a:t>The data we used  in this analysis was sourced from 3 datasets:</a:t>
             </a:r>
@@ -6550,38 +6551,46 @@
             <a:pPr marL="0" indent="0">
               <a:buNone/>
             </a:pPr>
-            <a:endParaRPr lang="en-US">
+            <a:endParaRPr lang="en-US" dirty="0">
               <a:solidFill>
                 <a:schemeClr val="bg1"/>
               </a:solidFill>
+              <a:latin typeface="Times New Roman" panose="02020603050405020304" pitchFamily="18" charset="0"/>
+              <a:cs typeface="Times New Roman" panose="02020603050405020304" pitchFamily="18" charset="0"/>
             </a:endParaRPr>
           </a:p>
           <a:p>
             <a:r>
-              <a:rPr lang="en-US">
+              <a:rPr lang="en-US" dirty="0">
                 <a:solidFill>
                   <a:schemeClr val="bg1"/>
                 </a:solidFill>
+                <a:latin typeface="Times New Roman" panose="02020603050405020304" pitchFamily="18" charset="0"/>
+                <a:cs typeface="Times New Roman" panose="02020603050405020304" pitchFamily="18" charset="0"/>
               </a:rPr>
               <a:t>Box Office Mojo</a:t>
             </a:r>
           </a:p>
           <a:p>
             <a:r>
-              <a:rPr lang="en-US">
+              <a:rPr lang="en-US" dirty="0">
                 <a:solidFill>
                   <a:schemeClr val="bg1"/>
                 </a:solidFill>
+                <a:latin typeface="Times New Roman" panose="02020603050405020304" pitchFamily="18" charset="0"/>
+                <a:cs typeface="Times New Roman" panose="02020603050405020304" pitchFamily="18" charset="0"/>
               </a:rPr>
               <a:t>IMDB</a:t>
             </a:r>
           </a:p>
           <a:p>
             <a:r>
-              <a:rPr lang="en-US">
+              <a:rPr lang="en-US" dirty="0">
                 <a:solidFill>
                   <a:schemeClr val="bg1"/>
                 </a:solidFill>
+                <a:latin typeface="Times New Roman" panose="02020603050405020304" pitchFamily="18" charset="0"/>
+                <a:cs typeface="Times New Roman" panose="02020603050405020304" pitchFamily="18" charset="0"/>
               </a:rPr>
               <a:t>The Numbers</a:t>
             </a:r>
@@ -6590,7 +6599,7 @@
             <a:pPr marL="0" indent="0">
               <a:buNone/>
             </a:pPr>
-            <a:endParaRPr lang="LID4096">
+            <a:endParaRPr lang="LID4096" dirty="0">
               <a:solidFill>
                 <a:schemeClr val="bg1"/>
               </a:solidFill>
@@ -6650,10 +6659,16 @@
           <a:lstStyle/>
           <a:p>
             <a:r>
-              <a:rPr lang="en-US" dirty="0"/>
+              <a:rPr lang="en-US" dirty="0">
+                <a:latin typeface="Times New Roman" panose="02020603050405020304" pitchFamily="18" charset="0"/>
+                <a:cs typeface="Times New Roman" panose="02020603050405020304" pitchFamily="18" charset="0"/>
+              </a:rPr>
               <a:t>Popularity of Movie Genres</a:t>
             </a:r>
-            <a:endParaRPr lang="LID4096" dirty="0"/>
+            <a:endParaRPr lang="LID4096" dirty="0">
+              <a:latin typeface="Times New Roman" panose="02020603050405020304" pitchFamily="18" charset="0"/>
+              <a:cs typeface="Times New Roman" panose="02020603050405020304" pitchFamily="18" charset="0"/>
+            </a:endParaRPr>
           </a:p>
         </p:txBody>
       </p:sp>
@@ -6735,17 +6750,34 @@
           </a:xfrm>
         </p:spPr>
         <p:txBody>
-          <a:bodyPr/>
+          <a:bodyPr>
+            <a:normAutofit/>
+          </a:bodyPr>
           <a:lstStyle/>
           <a:p>
             <a:pPr marL="0" indent="0">
               <a:buNone/>
             </a:pPr>
-            <a:r>
-              <a:rPr lang="en-US" dirty="0"/>
+            <a:endParaRPr lang="en-US" sz="2600" dirty="0">
+              <a:latin typeface="Times New Roman" panose="02020603050405020304" pitchFamily="18" charset="0"/>
+              <a:cs typeface="Times New Roman" panose="02020603050405020304" pitchFamily="18" charset="0"/>
+            </a:endParaRPr>
+          </a:p>
+          <a:p>
+            <a:pPr marL="0" indent="0">
+              <a:buNone/>
+            </a:pPr>
+            <a:r>
+              <a:rPr lang="en-US" dirty="0">
+                <a:latin typeface="Times New Roman" panose="02020603050405020304" pitchFamily="18" charset="0"/>
+                <a:cs typeface="Times New Roman" panose="02020603050405020304" pitchFamily="18" charset="0"/>
+              </a:rPr>
               <a:t>Movies with a combination of Action, Adventure and Sci-Fi genres are the most popular movies.</a:t>
             </a:r>
-            <a:endParaRPr lang="LID4096" dirty="0"/>
+            <a:endParaRPr lang="LID4096" dirty="0">
+              <a:latin typeface="Times New Roman" panose="02020603050405020304" pitchFamily="18" charset="0"/>
+              <a:cs typeface="Times New Roman" panose="02020603050405020304" pitchFamily="18" charset="0"/>
+            </a:endParaRPr>
           </a:p>
         </p:txBody>
       </p:sp>
@@ -6930,17 +6962,34 @@
           </a:xfrm>
         </p:spPr>
         <p:txBody>
-          <a:bodyPr/>
+          <a:bodyPr>
+            <a:normAutofit/>
+          </a:bodyPr>
           <a:lstStyle/>
           <a:p>
             <a:pPr marL="0" indent="0">
               <a:buNone/>
             </a:pPr>
-            <a:r>
-              <a:rPr lang="en-US" dirty="0"/>
+            <a:endParaRPr lang="en-US" dirty="0">
+              <a:latin typeface="Times New Roman" panose="02020603050405020304" pitchFamily="18" charset="0"/>
+              <a:cs typeface="Times New Roman" panose="02020603050405020304" pitchFamily="18" charset="0"/>
+            </a:endParaRPr>
+          </a:p>
+          <a:p>
+            <a:pPr marL="0" indent="0">
+              <a:buNone/>
+            </a:pPr>
+            <a:r>
+              <a:rPr lang="en-US" dirty="0">
+                <a:latin typeface="Times New Roman" panose="02020603050405020304" pitchFamily="18" charset="0"/>
+                <a:cs typeface="Times New Roman" panose="02020603050405020304" pitchFamily="18" charset="0"/>
+              </a:rPr>
               <a:t>Releasing movies in December would likely yield the highest return on investment by the movie.</a:t>
             </a:r>
-            <a:endParaRPr lang="LID4096" dirty="0"/>
+            <a:endParaRPr lang="LID4096" dirty="0">
+              <a:latin typeface="Times New Roman" panose="02020603050405020304" pitchFamily="18" charset="0"/>
+              <a:cs typeface="Times New Roman" panose="02020603050405020304" pitchFamily="18" charset="0"/>
+            </a:endParaRPr>
           </a:p>
         </p:txBody>
       </p:sp>
@@ -7009,15 +7058,6 @@
 <file path=ppt/slides/slide6.xml><?xml version="1.0" encoding="utf-8"?>
 <p:sld xmlns:a="http://schemas.openxmlformats.org/drawingml/2006/main" xmlns:r="http://schemas.openxmlformats.org/officeDocument/2006/relationships" xmlns:p="http://schemas.openxmlformats.org/presentationml/2006/main">
   <p:cSld>
-    <p:bg>
-      <p:bgPr>
-        <a:blipFill>
-          <a:blip r:embed="rId2"/>
-          <a:stretch/>
-        </a:blipFill>
-        <a:effectLst/>
-      </p:bgPr>
-    </p:bg>
     <p:spTree>
       <p:nvGrpSpPr>
         <p:cNvPr id="1" name=""/>
@@ -7032,353 +7072,80 @@
           <a:chExt cx="0" cy="0"/>
         </a:xfrm>
       </p:grpSpPr>
-      <p:grpSp>
-        <p:nvGrpSpPr>
-          <p:cNvPr id="47" name="Group 28">
+      <p:sp>
+        <p:nvSpPr>
+          <p:cNvPr id="2" name="Title 1">
             <a:extLst>
               <a:ext uri="{FF2B5EF4-FFF2-40B4-BE49-F238E27FC236}">
-                <a16:creationId xmlns:a16="http://schemas.microsoft.com/office/drawing/2014/main" id="{3F6D81C7-B083-478E-82FE-089A8CB72EB8}"/>
-              </a:ext>
-              <a:ext uri="{C183D7F6-B498-43B3-948B-1728B52AA6E4}">
-                <adec:decorative xmlns:adec="http://schemas.microsoft.com/office/drawing/2017/decorative" val="1"/>
+                <a16:creationId xmlns:a16="http://schemas.microsoft.com/office/drawing/2014/main" id="{77A49776-0EE8-1A7A-1233-975CE0A3FE19}"/>
               </a:ext>
             </a:extLst>
           </p:cNvPr>
-          <p:cNvGrpSpPr>
-            <a:grpSpLocks noGrp="1" noUngrp="1" noRot="1" noChangeAspect="1" noMove="1" noResize="1"/>
-          </p:cNvGrpSpPr>
-          <p:nvPr>
-            <p:extLst>
-              <p:ext uri="{386F3935-93C4-4BCD-93E2-E3B085C9AB24}">
-                <p16:designElem xmlns:p16="http://schemas.microsoft.com/office/powerpoint/2015/main" val="1"/>
-              </p:ext>
-            </p:extLst>
-          </p:nvPr>
-        </p:nvGrpSpPr>
-        <p:grpSpPr>
-          <a:xfrm>
-            <a:off x="-15736" y="0"/>
-            <a:ext cx="12229962" cy="6856214"/>
-            <a:chOff x="-15736" y="0"/>
-            <a:chExt cx="12229962" cy="6856214"/>
-          </a:xfrm>
-        </p:grpSpPr>
-        <p:pic>
-          <p:nvPicPr>
-            <p:cNvPr id="30" name="Picture 29">
-              <a:extLst>
-                <a:ext uri="{FF2B5EF4-FFF2-40B4-BE49-F238E27FC236}">
-                  <a16:creationId xmlns:a16="http://schemas.microsoft.com/office/drawing/2014/main" id="{8398EDA2-4889-433D-AC01-5214D79764ED}"/>
-                </a:ext>
-                <a:ext uri="{C183D7F6-B498-43B3-948B-1728B52AA6E4}">
-                  <adec:decorative xmlns:adec="http://schemas.microsoft.com/office/drawing/2017/decorative" val="1"/>
-                </a:ext>
-              </a:extLst>
-            </p:cNvPr>
-            <p:cNvPicPr>
-              <a:picLocks noChangeAspect="1"/>
-            </p:cNvPicPr>
-            <p:nvPr>
-              <p:extLst>
-                <p:ext uri="{386F3935-93C4-4BCD-93E2-E3B085C9AB24}">
-                  <p16:designElem xmlns:p16="http://schemas.microsoft.com/office/powerpoint/2015/main" val="1"/>
-                </p:ext>
-              </p:extLst>
-            </p:nvPr>
-          </p:nvPicPr>
-          <p:blipFill>
-            <a:blip r:embed="rId3">
-              <a:extLst>
-                <a:ext uri="{28A0092B-C50C-407E-A947-70E740481C1C}">
-                  <a14:useLocalDpi xmlns:a14="http://schemas.microsoft.com/office/drawing/2010/main" val="0"/>
-                </a:ext>
-              </a:extLst>
-            </a:blip>
-            <a:stretch>
-              <a:fillRect/>
-            </a:stretch>
-          </p:blipFill>
-          <p:spPr>
-            <a:xfrm>
-              <a:off x="0" y="0"/>
-              <a:ext cx="12188825" cy="6856214"/>
-            </a:xfrm>
-            <a:prstGeom prst="rect">
-              <a:avLst/>
-            </a:prstGeom>
-          </p:spPr>
-        </p:pic>
-        <p:sp>
-          <p:nvSpPr>
-            <p:cNvPr id="31" name="Rectangle 30">
-              <a:extLst>
-                <a:ext uri="{FF2B5EF4-FFF2-40B4-BE49-F238E27FC236}">
-                  <a16:creationId xmlns:a16="http://schemas.microsoft.com/office/drawing/2014/main" id="{0099D46A-AF52-46FD-938B-D31189460A2F}"/>
-                </a:ext>
-                <a:ext uri="{C183D7F6-B498-43B3-948B-1728B52AA6E4}">
-                  <adec:decorative xmlns:adec="http://schemas.microsoft.com/office/drawing/2017/decorative" val="1"/>
-                </a:ext>
-              </a:extLst>
-            </p:cNvPr>
-            <p:cNvSpPr/>
-            <p:nvPr>
-              <p:extLst>
-                <p:ext uri="{386F3935-93C4-4BCD-93E2-E3B085C9AB24}">
-                  <p16:designElem xmlns:p16="http://schemas.microsoft.com/office/powerpoint/2015/main" val="1"/>
-                </p:ext>
-              </p:extLst>
-            </p:nvPr>
-          </p:nvSpPr>
-          <p:spPr>
-            <a:xfrm>
-              <a:off x="608012" y="609600"/>
-              <a:ext cx="10972800" cy="5638800"/>
-            </a:xfrm>
-            <a:prstGeom prst="rect">
-              <a:avLst/>
-            </a:prstGeom>
-            <a:noFill/>
-            <a:ln w="15875" cap="flat">
-              <a:miter lim="800000"/>
-            </a:ln>
-          </p:spPr>
-          <p:style>
-            <a:lnRef idx="1">
-              <a:schemeClr val="accent1"/>
-            </a:lnRef>
-            <a:fillRef idx="3">
-              <a:schemeClr val="accent1"/>
-            </a:fillRef>
-            <a:effectRef idx="2">
-              <a:schemeClr val="accent1"/>
-            </a:effectRef>
-            <a:fontRef idx="minor">
-              <a:schemeClr val="lt1"/>
-            </a:fontRef>
-          </p:style>
-        </p:sp>
-        <p:pic>
-          <p:nvPicPr>
-            <p:cNvPr id="32" name="Picture 31">
-              <a:extLst>
-                <a:ext uri="{FF2B5EF4-FFF2-40B4-BE49-F238E27FC236}">
-                  <a16:creationId xmlns:a16="http://schemas.microsoft.com/office/drawing/2014/main" id="{C933E919-C473-4F0E-9DBC-CC65FC9E926E}"/>
-                </a:ext>
-                <a:ext uri="{C183D7F6-B498-43B3-948B-1728B52AA6E4}">
-                  <adec:decorative xmlns:adec="http://schemas.microsoft.com/office/drawing/2017/decorative" val="1"/>
-                </a:ext>
-              </a:extLst>
-            </p:cNvPr>
-            <p:cNvPicPr>
-              <a:picLocks noChangeAspect="1"/>
-            </p:cNvPicPr>
-            <p:nvPr>
-              <p:extLst>
-                <p:ext uri="{386F3935-93C4-4BCD-93E2-E3B085C9AB24}">
-                  <p16:designElem xmlns:p16="http://schemas.microsoft.com/office/powerpoint/2015/main" val="1"/>
-                </p:ext>
-              </p:extLst>
-            </p:nvPr>
-          </p:nvPicPr>
-          <p:blipFill rotWithShape="1">
-            <a:blip r:embed="rId4">
-              <a:extLst>
-                <a:ext uri="{28A0092B-C50C-407E-A947-70E740481C1C}">
-                  <a14:useLocalDpi xmlns:a14="http://schemas.microsoft.com/office/drawing/2010/main" val="0"/>
-                </a:ext>
-              </a:extLst>
-            </a:blip>
-            <a:srcRect/>
-            <a:stretch/>
-          </p:blipFill>
-          <p:spPr>
-            <a:xfrm>
-              <a:off x="-15736" y="3153832"/>
-              <a:ext cx="777240" cy="606425"/>
-            </a:xfrm>
-            <a:prstGeom prst="rect">
-              <a:avLst/>
-            </a:prstGeom>
-          </p:spPr>
-        </p:pic>
-        <p:pic>
-          <p:nvPicPr>
-            <p:cNvPr id="33" name="Picture 32">
-              <a:extLst>
-                <a:ext uri="{FF2B5EF4-FFF2-40B4-BE49-F238E27FC236}">
-                  <a16:creationId xmlns:a16="http://schemas.microsoft.com/office/drawing/2014/main" id="{FBBF3BDD-5C99-4FDC-BBCB-E711359D93F6}"/>
-                </a:ext>
-                <a:ext uri="{C183D7F6-B498-43B3-948B-1728B52AA6E4}">
-                  <adec:decorative xmlns:adec="http://schemas.microsoft.com/office/drawing/2017/decorative" val="1"/>
-                </a:ext>
-              </a:extLst>
-            </p:cNvPr>
-            <p:cNvPicPr>
-              <a:picLocks noChangeAspect="1"/>
-            </p:cNvPicPr>
-            <p:nvPr>
-              <p:extLst>
-                <p:ext uri="{386F3935-93C4-4BCD-93E2-E3B085C9AB24}">
-                  <p16:designElem xmlns:p16="http://schemas.microsoft.com/office/powerpoint/2015/main" val="1"/>
-                </p:ext>
-              </p:extLst>
-            </p:nvPr>
-          </p:nvPicPr>
-          <p:blipFill rotWithShape="1">
-            <a:blip r:embed="rId4">
-              <a:extLst>
-                <a:ext uri="{28A0092B-C50C-407E-A947-70E740481C1C}">
-                  <a14:useLocalDpi xmlns:a14="http://schemas.microsoft.com/office/drawing/2010/main" val="0"/>
-                </a:ext>
-              </a:extLst>
-            </a:blip>
-            <a:srcRect/>
-            <a:stretch/>
-          </p:blipFill>
-          <p:spPr>
-            <a:xfrm>
-              <a:off x="11436986" y="3153832"/>
-              <a:ext cx="777240" cy="606425"/>
-            </a:xfrm>
-            <a:prstGeom prst="rect">
-              <a:avLst/>
-            </a:prstGeom>
-          </p:spPr>
-        </p:pic>
-      </p:grpSp>
-      <p:cxnSp>
-        <p:nvCxnSpPr>
-          <p:cNvPr id="48" name="Straight Connector 34">
+          <p:cNvSpPr>
+            <a:spLocks noGrp="1"/>
+          </p:cNvSpPr>
+          <p:nvPr>
+            <p:ph type="title"/>
+          </p:nvPr>
+        </p:nvSpPr>
+        <p:spPr/>
+        <p:txBody>
+          <a:bodyPr/>
+          <a:lstStyle/>
+          <a:p>
+            <a:r>
+              <a:rPr lang="en-US" dirty="0">
+                <a:solidFill>
+                  <a:srgbClr val="262626"/>
+                </a:solidFill>
+                <a:latin typeface="Times New Roman" panose="02020603050405020304" pitchFamily="18" charset="0"/>
+                <a:cs typeface="Times New Roman" panose="02020603050405020304" pitchFamily="18" charset="0"/>
+              </a:rPr>
+              <a:t>Studios with the Highest Gross Revenues</a:t>
+            </a:r>
+            <a:endParaRPr lang="LID4096" dirty="0">
+              <a:latin typeface="Times New Roman" panose="02020603050405020304" pitchFamily="18" charset="0"/>
+              <a:cs typeface="Times New Roman" panose="02020603050405020304" pitchFamily="18" charset="0"/>
+            </a:endParaRPr>
+          </a:p>
+        </p:txBody>
+      </p:sp>
+      <p:sp>
+        <p:nvSpPr>
+          <p:cNvPr id="3" name="Text Placeholder 2">
             <a:extLst>
               <a:ext uri="{FF2B5EF4-FFF2-40B4-BE49-F238E27FC236}">
-                <a16:creationId xmlns:a16="http://schemas.microsoft.com/office/drawing/2014/main" id="{F06B54F2-CD11-4359-A7D6-DA7C76C091A6}"/>
-              </a:ext>
-              <a:ext uri="{C183D7F6-B498-43B3-948B-1728B52AA6E4}">
-                <adec:decorative xmlns:adec="http://schemas.microsoft.com/office/drawing/2017/decorative" val="1"/>
+                <a16:creationId xmlns:a16="http://schemas.microsoft.com/office/drawing/2014/main" id="{C9F1B84C-A15F-D07B-2E20-66B8C73729BC}"/>
               </a:ext>
             </a:extLst>
           </p:cNvPr>
-          <p:cNvCxnSpPr>
-            <a:cxnSpLocks noGrp="1" noRot="1" noChangeAspect="1" noMove="1" noResize="1" noEditPoints="1" noAdjustHandles="1" noChangeArrowheads="1" noChangeShapeType="1"/>
-          </p:cNvCxnSpPr>
-          <p:nvPr>
-            <p:extLst>
-              <p:ext uri="{386F3935-93C4-4BCD-93E2-E3B085C9AB24}">
-                <p16:designElem xmlns:p16="http://schemas.microsoft.com/office/powerpoint/2015/main" val="1"/>
-              </p:ext>
-            </p:extLst>
-          </p:nvPr>
-        </p:nvCxnSpPr>
-        <p:spPr>
-          <a:xfrm>
-            <a:off x="1396169" y="2421466"/>
-            <a:ext cx="9407298" cy="0"/>
-          </a:xfrm>
-          <a:prstGeom prst="line">
-            <a:avLst/>
-          </a:prstGeom>
-          <a:ln w="15875"/>
-        </p:spPr>
-        <p:style>
-          <a:lnRef idx="2">
-            <a:schemeClr val="accent1"/>
-          </a:lnRef>
-          <a:fillRef idx="0">
-            <a:schemeClr val="accent1"/>
-          </a:fillRef>
-          <a:effectRef idx="1">
-            <a:schemeClr val="accent1"/>
-          </a:effectRef>
-          <a:fontRef idx="minor">
-            <a:schemeClr val="tx1"/>
-          </a:fontRef>
-        </p:style>
-      </p:cxnSp>
-      <p:sp>
-        <p:nvSpPr>
-          <p:cNvPr id="2" name="Title 1">
+          <p:cNvSpPr>
+            <a:spLocks noGrp="1"/>
+          </p:cNvSpPr>
+          <p:nvPr>
+            <p:ph type="body" idx="1"/>
+          </p:nvPr>
+        </p:nvSpPr>
+        <p:spPr>
+          <a:xfrm>
+            <a:off x="1295400" y="2658533"/>
+            <a:ext cx="4718304" cy="45719"/>
+          </a:xfrm>
+        </p:spPr>
+        <p:txBody>
+          <a:bodyPr/>
+          <a:lstStyle/>
+          <a:p>
+            <a:endParaRPr lang="LID4096" dirty="0"/>
+          </a:p>
+        </p:txBody>
+      </p:sp>
+      <p:pic>
+        <p:nvPicPr>
+          <p:cNvPr id="8" name="Content Placeholder 7" descr="Chart, bar chart">
             <a:extLst>
               <a:ext uri="{FF2B5EF4-FFF2-40B4-BE49-F238E27FC236}">
-                <a16:creationId xmlns:a16="http://schemas.microsoft.com/office/drawing/2014/main" id="{7312A599-F4C7-1A13-D7C9-9BBBDBBBBFF2}"/>
-              </a:ext>
-            </a:extLst>
-          </p:cNvPr>
-          <p:cNvSpPr>
-            <a:spLocks noGrp="1"/>
-          </p:cNvSpPr>
-          <p:nvPr>
-            <p:ph type="title"/>
-          </p:nvPr>
-        </p:nvSpPr>
-        <p:spPr>
-          <a:xfrm>
-            <a:off x="1295402" y="982132"/>
-            <a:ext cx="9601196" cy="1303867"/>
-          </a:xfrm>
-        </p:spPr>
-        <p:txBody>
-          <a:bodyPr vert="horz" lIns="91440" tIns="45720" rIns="91440" bIns="45720" rtlCol="0" anchor="ctr">
-            <a:normAutofit/>
-          </a:bodyPr>
-          <a:lstStyle/>
-          <a:p>
-            <a:r>
-              <a:rPr lang="en-US">
-                <a:solidFill>
-                  <a:srgbClr val="262626"/>
-                </a:solidFill>
-              </a:rPr>
-              <a:t>Studios with the Highest Gross Revenues</a:t>
-            </a:r>
-          </a:p>
-        </p:txBody>
-      </p:sp>
-      <p:sp>
-        <p:nvSpPr>
-          <p:cNvPr id="4" name="Content Placeholder 3">
-            <a:extLst>
-              <a:ext uri="{FF2B5EF4-FFF2-40B4-BE49-F238E27FC236}">
-                <a16:creationId xmlns:a16="http://schemas.microsoft.com/office/drawing/2014/main" id="{9A8D3848-1ABD-696C-2A49-C5CB561BF5E6}"/>
-              </a:ext>
-            </a:extLst>
-          </p:cNvPr>
-          <p:cNvSpPr>
-            <a:spLocks noGrp="1"/>
-          </p:cNvSpPr>
-          <p:nvPr>
-            <p:ph sz="half" idx="2"/>
-          </p:nvPr>
-        </p:nvSpPr>
-        <p:spPr>
-          <a:xfrm>
-            <a:off x="1295402" y="2556932"/>
-            <a:ext cx="6256866" cy="3318936"/>
-          </a:xfrm>
-        </p:spPr>
-        <p:txBody>
-          <a:bodyPr vert="horz" lIns="91440" tIns="45720" rIns="91440" bIns="45720" rtlCol="0" anchor="t">
-            <a:normAutofit/>
-          </a:bodyPr>
-          <a:lstStyle/>
-          <a:p>
-            <a:pPr marL="0" indent="0"/>
-            <a:r>
-              <a:rPr lang="en-US">
-                <a:solidFill>
-                  <a:srgbClr val="262626"/>
-                </a:solidFill>
-              </a:rPr>
-              <a:t>Microsoft Studios should consider patnering with BV studios as this would likely lead to the highest gross revenues from the movie.</a:t>
-            </a:r>
-          </a:p>
-        </p:txBody>
-      </p:sp>
-      <p:pic>
-        <p:nvPicPr>
-          <p:cNvPr id="5" name="Content Placeholder 4">
-            <a:extLst>
-              <a:ext uri="{FF2B5EF4-FFF2-40B4-BE49-F238E27FC236}">
-                <a16:creationId xmlns:a16="http://schemas.microsoft.com/office/drawing/2014/main" id="{33C28F91-CFCE-F0A8-C398-AC2D3218DF5F}"/>
+                <a16:creationId xmlns:a16="http://schemas.microsoft.com/office/drawing/2014/main" id="{1EA16F0C-A621-ABA7-C739-77C79F575096}"/>
               </a:ext>
             </a:extLst>
           </p:cNvPr>
@@ -7386,35 +7153,117 @@
             <a:picLocks noGrp="1" noChangeAspect="1"/>
           </p:cNvPicPr>
           <p:nvPr>
-            <p:ph sz="half" idx="1"/>
+            <p:ph sz="half" idx="2"/>
           </p:nvPr>
         </p:nvPicPr>
         <p:blipFill>
-          <a:blip r:embed="rId5"/>
+          <a:blip r:embed="rId2">
+            <a:extLst>
+              <a:ext uri="{28A0092B-C50C-407E-A947-70E740481C1C}">
+                <a14:useLocalDpi xmlns:a14="http://schemas.microsoft.com/office/drawing/2010/main" val="0"/>
+              </a:ext>
+            </a:extLst>
+          </a:blip>
           <a:stretch>
             <a:fillRect/>
           </a:stretch>
         </p:blipFill>
         <p:spPr>
           <a:xfrm>
-            <a:off x="8085026" y="2949417"/>
-            <a:ext cx="2739728" cy="2356165"/>
-          </a:xfrm>
-          <a:prstGeom prst="rect">
-            <a:avLst/>
-          </a:prstGeom>
-          <a:ln w="57150" cmpd="thickThin">
-            <a:solidFill>
-              <a:srgbClr val="7F7F7F"/>
-            </a:solidFill>
-            <a:miter lim="800000"/>
-          </a:ln>
+            <a:off x="1293026" y="2658533"/>
+            <a:ext cx="4718304" cy="3216275"/>
+          </a:xfrm>
         </p:spPr>
       </p:pic>
+      <p:sp>
+        <p:nvSpPr>
+          <p:cNvPr id="5" name="Text Placeholder 4">
+            <a:extLst>
+              <a:ext uri="{FF2B5EF4-FFF2-40B4-BE49-F238E27FC236}">
+                <a16:creationId xmlns:a16="http://schemas.microsoft.com/office/drawing/2014/main" id="{41414D6D-7815-F9D4-4EE6-55C9EBA30464}"/>
+              </a:ext>
+            </a:extLst>
+          </p:cNvPr>
+          <p:cNvSpPr>
+            <a:spLocks noGrp="1"/>
+          </p:cNvSpPr>
+          <p:nvPr>
+            <p:ph type="body" sz="quarter" idx="3"/>
+          </p:nvPr>
+        </p:nvSpPr>
+        <p:spPr/>
+        <p:txBody>
+          <a:bodyPr/>
+          <a:lstStyle/>
+          <a:p>
+            <a:endParaRPr lang="LID4096" dirty="0"/>
+          </a:p>
+        </p:txBody>
+      </p:sp>
+      <p:sp>
+        <p:nvSpPr>
+          <p:cNvPr id="6" name="Content Placeholder 5">
+            <a:extLst>
+              <a:ext uri="{FF2B5EF4-FFF2-40B4-BE49-F238E27FC236}">
+                <a16:creationId xmlns:a16="http://schemas.microsoft.com/office/drawing/2014/main" id="{3181CB2D-AF2D-47D3-CA30-B95A73401925}"/>
+              </a:ext>
+            </a:extLst>
+          </p:cNvPr>
+          <p:cNvSpPr>
+            <a:spLocks noGrp="1"/>
+          </p:cNvSpPr>
+          <p:nvPr>
+            <p:ph sz="quarter" idx="4"/>
+          </p:nvPr>
+        </p:nvSpPr>
+        <p:spPr>
+          <a:xfrm>
+            <a:off x="6180670" y="2658534"/>
+            <a:ext cx="4718304" cy="3217334"/>
+          </a:xfrm>
+        </p:spPr>
+        <p:txBody>
+          <a:bodyPr/>
+          <a:lstStyle/>
+          <a:p>
+            <a:pPr marL="0" indent="0">
+              <a:buNone/>
+            </a:pPr>
+            <a:endParaRPr lang="en-US" sz="2600" dirty="0">
+              <a:solidFill>
+                <a:srgbClr val="262626"/>
+              </a:solidFill>
+              <a:latin typeface="Times New Roman" panose="02020603050405020304" pitchFamily="18" charset="0"/>
+              <a:cs typeface="Times New Roman" panose="02020603050405020304" pitchFamily="18" charset="0"/>
+            </a:endParaRPr>
+          </a:p>
+          <a:p>
+            <a:pPr marL="0" indent="0">
+              <a:buNone/>
+            </a:pPr>
+            <a:r>
+              <a:rPr lang="en-US" dirty="0">
+                <a:solidFill>
+                  <a:srgbClr val="262626"/>
+                </a:solidFill>
+                <a:latin typeface="Times New Roman" panose="02020603050405020304" pitchFamily="18" charset="0"/>
+                <a:cs typeface="Times New Roman" panose="02020603050405020304" pitchFamily="18" charset="0"/>
+              </a:rPr>
+              <a:t>Microsoft Studios should consider partnering with BV studios as this would likely lead to the highest gross revenues from the movie.</a:t>
+            </a:r>
+          </a:p>
+          <a:p>
+            <a:pPr marL="0" indent="0">
+              <a:buNone/>
+            </a:pPr>
+            <a:endParaRPr lang="LID4096" dirty="0"/>
+          </a:p>
+        </p:txBody>
+      </p:sp>
     </p:spTree>
     <p:extLst>
       <p:ext uri="{BB962C8B-B14F-4D97-AF65-F5344CB8AC3E}">
-        <p14:creationId xmlns:p14="http://schemas.microsoft.com/office/powerpoint/2010/main" val="496993742"/>
+        <p14:creationId xmlns:p14="http://schemas.microsoft.com/office/powerpoint/2010/main" val="1567205303"/>
       </p:ext>
     </p:extLst>
   </p:cSld>
@@ -7619,17 +7468,21 @@
           <a:lstStyle/>
           <a:p>
             <a:r>
-              <a:rPr lang="en-US">
+              <a:rPr lang="en-US" dirty="0">
                 <a:solidFill>
                   <a:srgbClr val="FFFFFF"/>
                 </a:solidFill>
+                <a:latin typeface="Times New Roman" panose="02020603050405020304" pitchFamily="18" charset="0"/>
+                <a:cs typeface="Times New Roman" panose="02020603050405020304" pitchFamily="18" charset="0"/>
               </a:rPr>
               <a:t>Recommendations</a:t>
             </a:r>
-            <a:endParaRPr lang="LID4096">
+            <a:endParaRPr lang="LID4096" dirty="0">
               <a:solidFill>
                 <a:srgbClr val="FFFFFF"/>
               </a:solidFill>
+              <a:latin typeface="Times New Roman" panose="02020603050405020304" pitchFamily="18" charset="0"/>
+              <a:cs typeface="Times New Roman" panose="02020603050405020304" pitchFamily="18" charset="0"/>
             </a:endParaRPr>
           </a:p>
         </p:txBody>
@@ -7805,12 +7658,21 @@
         </p:spPr>
         <p:txBody>
           <a:bodyPr>
-            <a:normAutofit/>
+            <a:normAutofit lnSpcReduction="10000"/>
           </a:bodyPr>
           <a:lstStyle/>
           <a:p>
-            <a:r>
-              <a:rPr lang="en-US"/>
+            <a:endParaRPr lang="en-US" dirty="0">
+              <a:latin typeface="Times New Roman" panose="02020603050405020304" pitchFamily="18" charset="0"/>
+              <a:cs typeface="Times New Roman" panose="02020603050405020304" pitchFamily="18" charset="0"/>
+            </a:endParaRPr>
+          </a:p>
+          <a:p>
+            <a:r>
+              <a:rPr lang="en-US" dirty="0">
+                <a:latin typeface="Times New Roman" panose="02020603050405020304" pitchFamily="18" charset="0"/>
+                <a:cs typeface="Times New Roman" panose="02020603050405020304" pitchFamily="18" charset="0"/>
+              </a:rPr>
               <a:t>Movies with a combination of Action, Adventure and Sci-Fi genres were the most popular. Microsoft should consider producing a movie with this combination of genres.</a:t>
             </a:r>
           </a:p>
@@ -7832,25 +7694,30 @@
               <a:defRPr/>
             </a:pPr>
             <a:r>
-              <a:rPr kumimoji="0" lang="en-US" b="0" i="0" u="none" strike="noStrike" kern="1200" cap="none" spc="0" normalizeH="0" baseline="0" noProof="0">
+              <a:rPr kumimoji="0" lang="en-US" b="0" i="0" u="none" strike="noStrike" kern="1200" cap="none" spc="0" normalizeH="0" baseline="0" noProof="0" dirty="0">
                 <a:ln>
                   <a:noFill/>
                 </a:ln>
                 <a:effectLst/>
                 <a:uLnTx/>
                 <a:uFillTx/>
-                <a:latin typeface="Garamond" panose="02020404030301010803"/>
-                <a:ea typeface="+mn-ea"/>
-                <a:cs typeface="+mn-cs"/>
+                <a:latin typeface="Times New Roman" panose="02020603050405020304" pitchFamily="18" charset="0"/>
+                <a:cs typeface="Times New Roman" panose="02020603050405020304" pitchFamily="18" charset="0"/>
               </a:rPr>
               <a:t>Releasing movies in December would likely lead to the highest return on investment by the movie.</a:t>
             </a:r>
-            <a:endParaRPr lang="en-US"/>
-          </a:p>
-          <a:p>
-            <a:r>
-              <a:rPr lang="en-US"/>
-              <a:t>BV Studios had the highest revenues generated by movies produced. Microsoft Studios should consider patnering with them.</a:t>
+            <a:endParaRPr lang="en-US" dirty="0">
+              <a:latin typeface="Times New Roman" panose="02020603050405020304" pitchFamily="18" charset="0"/>
+              <a:cs typeface="Times New Roman" panose="02020603050405020304" pitchFamily="18" charset="0"/>
+            </a:endParaRPr>
+          </a:p>
+          <a:p>
+            <a:r>
+              <a:rPr lang="en-US" dirty="0">
+                <a:latin typeface="Times New Roman" panose="02020603050405020304" pitchFamily="18" charset="0"/>
+                <a:cs typeface="Times New Roman" panose="02020603050405020304" pitchFamily="18" charset="0"/>
+              </a:rPr>
+              <a:t>BV Studios had the highest revenues generated by movies produced. Microsoft Studios should consider partnering with them.</a:t>
             </a:r>
           </a:p>
           <a:p>
@@ -8390,17 +8257,21 @@
           <a:lstStyle/>
           <a:p>
             <a:r>
-              <a:rPr lang="en-US">
+              <a:rPr lang="en-US" dirty="0">
                 <a:solidFill>
                   <a:schemeClr val="bg1"/>
                 </a:solidFill>
+                <a:latin typeface="Times New Roman" panose="02020603050405020304" pitchFamily="18" charset="0"/>
+                <a:cs typeface="Times New Roman" panose="02020603050405020304" pitchFamily="18" charset="0"/>
               </a:rPr>
               <a:t>THANK YOU</a:t>
             </a:r>
-            <a:endParaRPr lang="LID4096">
+            <a:endParaRPr lang="LID4096" dirty="0">
               <a:solidFill>
                 <a:schemeClr val="bg1"/>
               </a:solidFill>
+              <a:latin typeface="Times New Roman" panose="02020603050405020304" pitchFamily="18" charset="0"/>
+              <a:cs typeface="Times New Roman" panose="02020603050405020304" pitchFamily="18" charset="0"/>
             </a:endParaRPr>
           </a:p>
         </p:txBody>
@@ -8434,17 +8305,21 @@
           <a:lstStyle/>
           <a:p>
             <a:r>
-              <a:rPr lang="en-US">
+              <a:rPr lang="en-US" sz="2800" dirty="0">
                 <a:solidFill>
                   <a:schemeClr val="bg1"/>
                 </a:solidFill>
+                <a:latin typeface="Times New Roman" panose="02020603050405020304" pitchFamily="18" charset="0"/>
+                <a:cs typeface="Times New Roman" panose="02020603050405020304" pitchFamily="18" charset="0"/>
               </a:rPr>
               <a:t>Samwel Kagwi</a:t>
             </a:r>
-            <a:endParaRPr lang="LID4096">
+            <a:endParaRPr lang="LID4096" sz="2800" dirty="0">
               <a:solidFill>
                 <a:schemeClr val="bg1"/>
               </a:solidFill>
+              <a:latin typeface="Times New Roman" panose="02020603050405020304" pitchFamily="18" charset="0"/>
+              <a:cs typeface="Times New Roman" panose="02020603050405020304" pitchFamily="18" charset="0"/>
             </a:endParaRPr>
           </a:p>
         </p:txBody>

</xml_diff>

<commit_message>
updated README and Presentation
</commit_message>
<xml_diff>
--- a/Presentation.pptx
+++ b/Presentation.pptx
@@ -450,7 +450,7 @@
           <a:p>
             <a:fld id="{C6551D90-F5A3-4B4B-90F6-E2708D62CC46}" type="datetimeFigureOut">
               <a:rPr lang="LID4096" smtClean="0"/>
-              <a:t>03/11/2023</a:t>
+              <a:t>03/12/2023</a:t>
             </a:fld>
             <a:endParaRPr lang="LID4096"/>
           </a:p>
@@ -774,7 +774,7 @@
           <a:p>
             <a:fld id="{C6551D90-F5A3-4B4B-90F6-E2708D62CC46}" type="datetimeFigureOut">
               <a:rPr lang="LID4096" smtClean="0"/>
-              <a:t>03/11/2023</a:t>
+              <a:t>03/12/2023</a:t>
             </a:fld>
             <a:endParaRPr lang="LID4096"/>
           </a:p>
@@ -1022,7 +1022,7 @@
           <a:p>
             <a:fld id="{C6551D90-F5A3-4B4B-90F6-E2708D62CC46}" type="datetimeFigureOut">
               <a:rPr lang="LID4096" smtClean="0"/>
-              <a:t>03/11/2023</a:t>
+              <a:t>03/12/2023</a:t>
             </a:fld>
             <a:endParaRPr lang="LID4096"/>
           </a:p>
@@ -1361,7 +1361,7 @@
           <a:p>
             <a:fld id="{C6551D90-F5A3-4B4B-90F6-E2708D62CC46}" type="datetimeFigureOut">
               <a:rPr lang="LID4096" smtClean="0"/>
-              <a:t>03/11/2023</a:t>
+              <a:t>03/12/2023</a:t>
             </a:fld>
             <a:endParaRPr lang="LID4096"/>
           </a:p>
@@ -1708,7 +1708,7 @@
           <a:p>
             <a:fld id="{C6551D90-F5A3-4B4B-90F6-E2708D62CC46}" type="datetimeFigureOut">
               <a:rPr lang="LID4096" smtClean="0"/>
-              <a:t>03/11/2023</a:t>
+              <a:t>03/12/2023</a:t>
             </a:fld>
             <a:endParaRPr lang="LID4096"/>
           </a:p>
@@ -2082,7 +2082,7 @@
           <a:p>
             <a:fld id="{C6551D90-F5A3-4B4B-90F6-E2708D62CC46}" type="datetimeFigureOut">
               <a:rPr lang="LID4096" smtClean="0"/>
-              <a:t>03/11/2023</a:t>
+              <a:t>03/12/2023</a:t>
             </a:fld>
             <a:endParaRPr lang="LID4096"/>
           </a:p>
@@ -2552,7 +2552,7 @@
           <a:p>
             <a:fld id="{C6551D90-F5A3-4B4B-90F6-E2708D62CC46}" type="datetimeFigureOut">
               <a:rPr lang="LID4096" smtClean="0"/>
-              <a:t>03/11/2023</a:t>
+              <a:t>03/12/2023</a:t>
             </a:fld>
             <a:endParaRPr lang="LID4096"/>
           </a:p>
@@ -2757,7 +2757,7 @@
           <a:p>
             <a:fld id="{C6551D90-F5A3-4B4B-90F6-E2708D62CC46}" type="datetimeFigureOut">
               <a:rPr lang="LID4096" smtClean="0"/>
-              <a:t>03/11/2023</a:t>
+              <a:t>03/12/2023</a:t>
             </a:fld>
             <a:endParaRPr lang="LID4096"/>
           </a:p>
@@ -2968,7 +2968,7 @@
           <a:p>
             <a:fld id="{C6551D90-F5A3-4B4B-90F6-E2708D62CC46}" type="datetimeFigureOut">
               <a:rPr lang="LID4096" smtClean="0"/>
-              <a:t>03/11/2023</a:t>
+              <a:t>03/12/2023</a:t>
             </a:fld>
             <a:endParaRPr lang="LID4096"/>
           </a:p>
@@ -3200,7 +3200,7 @@
           <a:p>
             <a:fld id="{C6551D90-F5A3-4B4B-90F6-E2708D62CC46}" type="datetimeFigureOut">
               <a:rPr lang="LID4096" smtClean="0"/>
-              <a:t>03/11/2023</a:t>
+              <a:t>03/12/2023</a:t>
             </a:fld>
             <a:endParaRPr lang="LID4096"/>
           </a:p>
@@ -3448,7 +3448,7 @@
           <a:p>
             <a:fld id="{C6551D90-F5A3-4B4B-90F6-E2708D62CC46}" type="datetimeFigureOut">
               <a:rPr lang="LID4096" smtClean="0"/>
-              <a:t>03/11/2023</a:t>
+              <a:t>03/12/2023</a:t>
             </a:fld>
             <a:endParaRPr lang="LID4096"/>
           </a:p>
@@ -3746,7 +3746,7 @@
           <a:p>
             <a:fld id="{C6551D90-F5A3-4B4B-90F6-E2708D62CC46}" type="datetimeFigureOut">
               <a:rPr lang="LID4096" smtClean="0"/>
-              <a:t>03/11/2023</a:t>
+              <a:t>03/12/2023</a:t>
             </a:fld>
             <a:endParaRPr lang="LID4096"/>
           </a:p>
@@ -4140,7 +4140,7 @@
           <a:p>
             <a:fld id="{C6551D90-F5A3-4B4B-90F6-E2708D62CC46}" type="datetimeFigureOut">
               <a:rPr lang="LID4096" smtClean="0"/>
-              <a:t>03/11/2023</a:t>
+              <a:t>03/12/2023</a:t>
             </a:fld>
             <a:endParaRPr lang="LID4096"/>
           </a:p>
@@ -4289,7 +4289,7 @@
           <a:p>
             <a:fld id="{C6551D90-F5A3-4B4B-90F6-E2708D62CC46}" type="datetimeFigureOut">
               <a:rPr lang="LID4096" smtClean="0"/>
-              <a:t>03/11/2023</a:t>
+              <a:t>03/12/2023</a:t>
             </a:fld>
             <a:endParaRPr lang="LID4096"/>
           </a:p>
@@ -4415,7 +4415,7 @@
           <a:p>
             <a:fld id="{C6551D90-F5A3-4B4B-90F6-E2708D62CC46}" type="datetimeFigureOut">
               <a:rPr lang="LID4096" smtClean="0"/>
-              <a:t>03/11/2023</a:t>
+              <a:t>03/12/2023</a:t>
             </a:fld>
             <a:endParaRPr lang="LID4096"/>
           </a:p>
@@ -4670,7 +4670,7 @@
           <a:p>
             <a:fld id="{C6551D90-F5A3-4B4B-90F6-E2708D62CC46}" type="datetimeFigureOut">
               <a:rPr lang="LID4096" smtClean="0"/>
-              <a:t>03/11/2023</a:t>
+              <a:t>03/12/2023</a:t>
             </a:fld>
             <a:endParaRPr lang="LID4096"/>
           </a:p>
@@ -4985,7 +4985,7 @@
           <a:p>
             <a:fld id="{C6551D90-F5A3-4B4B-90F6-E2708D62CC46}" type="datetimeFigureOut">
               <a:rPr lang="LID4096" smtClean="0"/>
-              <a:t>03/11/2023</a:t>
+              <a:t>03/12/2023</a:t>
             </a:fld>
             <a:endParaRPr lang="LID4096"/>
           </a:p>
@@ -5336,7 +5336,7 @@
           <a:p>
             <a:fld id="{C6551D90-F5A3-4B4B-90F6-E2708D62CC46}" type="datetimeFigureOut">
               <a:rPr lang="LID4096" smtClean="0"/>
-              <a:t>03/11/2023</a:t>
+              <a:t>03/12/2023</a:t>
             </a:fld>
             <a:endParaRPr lang="LID4096"/>
           </a:p>
@@ -5922,7 +5922,7 @@
         </p:nvSpPr>
         <p:spPr>
           <a:xfrm>
-            <a:off x="80579" y="4155786"/>
+            <a:off x="364359" y="4291762"/>
             <a:ext cx="11207620" cy="934538"/>
           </a:xfrm>
         </p:spPr>
@@ -5933,7 +5933,7 @@
           <a:lstStyle/>
           <a:p>
             <a:r>
-              <a:rPr lang="en-US" sz="2000" b="1" dirty="0">
+              <a:rPr lang="en-US" sz="2400" b="1" dirty="0">
                 <a:latin typeface="Times New Roman" panose="02020603050405020304" pitchFamily="18" charset="0"/>
                 <a:cs typeface="Times New Roman" panose="02020603050405020304" pitchFamily="18" charset="0"/>
               </a:rPr>
@@ -5941,20 +5941,14 @@
             </a:r>
           </a:p>
           <a:p>
-            <a:endParaRPr lang="en-US" sz="2000" b="1" dirty="0">
-              <a:latin typeface="Times New Roman" panose="02020603050405020304" pitchFamily="18" charset="0"/>
-              <a:cs typeface="Times New Roman" panose="02020603050405020304" pitchFamily="18" charset="0"/>
-            </a:endParaRPr>
-          </a:p>
-          <a:p>
-            <a:r>
-              <a:rPr lang="en-US" sz="2000" b="1" dirty="0">
+            <a:r>
+              <a:rPr lang="en-US" sz="2400" b="1" dirty="0">
                 <a:latin typeface="Times New Roman" panose="02020603050405020304" pitchFamily="18" charset="0"/>
                 <a:cs typeface="Times New Roman" panose="02020603050405020304" pitchFamily="18" charset="0"/>
               </a:rPr>
               <a:t>12 - March - 2023 </a:t>
             </a:r>
-            <a:endParaRPr lang="LID4096" sz="2000" b="1" dirty="0">
+            <a:endParaRPr lang="LID4096" sz="2400" b="1" dirty="0">
               <a:latin typeface="Times New Roman" panose="02020603050405020304" pitchFamily="18" charset="0"/>
               <a:cs typeface="Times New Roman" panose="02020603050405020304" pitchFamily="18" charset="0"/>
             </a:endParaRPr>
@@ -6104,7 +6098,7 @@
               <a:buNone/>
             </a:pPr>
             <a:r>
-              <a:rPr lang="en-US">
+              <a:rPr lang="en-US" dirty="0">
                 <a:latin typeface="Times New Roman" panose="02020603050405020304" pitchFamily="18" charset="0"/>
                 <a:cs typeface="Times New Roman" panose="02020603050405020304" pitchFamily="18" charset="0"/>
               </a:rPr>
@@ -6116,18 +6110,18 @@
               <a:buNone/>
             </a:pPr>
             <a:r>
-              <a:rPr lang="en-US">
+              <a:rPr lang="en-US" dirty="0">
                 <a:latin typeface="Times New Roman" panose="02020603050405020304" pitchFamily="18" charset="0"/>
                 <a:cs typeface="Times New Roman" panose="02020603050405020304" pitchFamily="18" charset="0"/>
               </a:rPr>
-              <a:t>With the analysis data, we then get some insights about movies that will help in decision  making to determine what films to create.</a:t>
+              <a:t>With the analysis data, we then get some insights about movies that will help in decision making, to determine what films to create.</a:t>
             </a:r>
           </a:p>
           <a:p>
             <a:pPr marL="0" indent="0">
               <a:buNone/>
             </a:pPr>
-            <a:endParaRPr lang="LID4096"/>
+            <a:endParaRPr lang="LID4096" dirty="0"/>
           </a:p>
         </p:txBody>
       </p:sp>
@@ -7101,7 +7095,7 @@
                 <a:latin typeface="Times New Roman" panose="02020603050405020304" pitchFamily="18" charset="0"/>
                 <a:cs typeface="Times New Roman" panose="02020603050405020304" pitchFamily="18" charset="0"/>
               </a:rPr>
-              <a:t>Studios with the Highest Gross Revenues</a:t>
+              <a:t>Top Studios by Gross Revenues</a:t>
             </a:r>
             <a:endParaRPr lang="LID4096" dirty="0">
               <a:latin typeface="Times New Roman" panose="02020603050405020304" pitchFamily="18" charset="0"/>

</xml_diff>

<commit_message>
updated notebook.pdf and added presentation.pdf
</commit_message>
<xml_diff>
--- a/Presentation.pptx
+++ b/Presentation.pptx
@@ -8,11 +8,12 @@
     <p:sldId id="256" r:id="rId2"/>
     <p:sldId id="257" r:id="rId3"/>
     <p:sldId id="270" r:id="rId4"/>
-    <p:sldId id="268" r:id="rId5"/>
-    <p:sldId id="269" r:id="rId6"/>
+    <p:sldId id="273" r:id="rId5"/>
+    <p:sldId id="268" r:id="rId6"/>
     <p:sldId id="271" r:id="rId7"/>
-    <p:sldId id="263" r:id="rId8"/>
-    <p:sldId id="267" r:id="rId9"/>
+    <p:sldId id="272" r:id="rId8"/>
+    <p:sldId id="263" r:id="rId9"/>
+    <p:sldId id="267" r:id="rId10"/>
   </p:sldIdLst>
   <p:sldSz cx="12192000" cy="6858000"/>
   <p:notesSz cx="6858000" cy="9144000"/>
@@ -6059,10 +6060,16 @@
           <a:lstStyle/>
           <a:p>
             <a:r>
-              <a:rPr lang="en-US"/>
+              <a:rPr lang="en-US" dirty="0">
+                <a:latin typeface="Times New Roman" panose="02020603050405020304" pitchFamily="18" charset="0"/>
+                <a:cs typeface="Times New Roman" panose="02020603050405020304" pitchFamily="18" charset="0"/>
+              </a:rPr>
               <a:t>Background</a:t>
             </a:r>
-            <a:endParaRPr lang="LID4096"/>
+            <a:endParaRPr lang="LID4096" dirty="0">
+              <a:latin typeface="Times New Roman" panose="02020603050405020304" pitchFamily="18" charset="0"/>
+              <a:cs typeface="Times New Roman" panose="02020603050405020304" pitchFamily="18" charset="0"/>
+            </a:endParaRPr>
           </a:p>
         </p:txBody>
       </p:sp>
@@ -6636,7 +6643,7 @@
           <p:cNvPr id="2" name="Title 1">
             <a:extLst>
               <a:ext uri="{FF2B5EF4-FFF2-40B4-BE49-F238E27FC236}">
-                <a16:creationId xmlns:a16="http://schemas.microsoft.com/office/drawing/2014/main" id="{A073DEBA-E58B-ED05-9C7B-8B23657EC3EE}"/>
+                <a16:creationId xmlns:a16="http://schemas.microsoft.com/office/drawing/2014/main" id="{F4F9CFFB-D377-0DC5-41C1-F22E21291890}"/>
               </a:ext>
             </a:extLst>
           </p:cNvPr>
@@ -6649,146 +6656,51 @@
         </p:nvSpPr>
         <p:spPr/>
         <p:txBody>
-          <a:bodyPr/>
-          <a:lstStyle/>
-          <a:p>
-            <a:r>
-              <a:rPr lang="en-US" dirty="0">
+          <a:bodyPr>
+            <a:normAutofit fontScale="90000"/>
+          </a:bodyPr>
+          <a:lstStyle/>
+          <a:p>
+            <a:r>
+              <a:rPr kumimoji="0" lang="en-US" sz="4400" b="1" i="0" u="none" strike="noStrike" kern="1200" cap="none" spc="0" normalizeH="0" baseline="0" noProof="0" dirty="0">
+                <a:ln w="3175" cmpd="sng">
+                  <a:noFill/>
+                </a:ln>
+                <a:solidFill>
+                  <a:prstClr val="black">
+                    <a:lumMod val="85000"/>
+                    <a:lumOff val="15000"/>
+                  </a:prstClr>
+                </a:solidFill>
+                <a:effectLst/>
+                <a:uLnTx/>
+                <a:uFillTx/>
                 <a:latin typeface="Times New Roman" panose="02020603050405020304" pitchFamily="18" charset="0"/>
                 <a:cs typeface="Times New Roman" panose="02020603050405020304" pitchFamily="18" charset="0"/>
               </a:rPr>
-              <a:t>Popularity of Movie Genres</a:t>
-            </a:r>
-            <a:endParaRPr lang="LID4096" dirty="0">
+              <a:t>Return on Investment</a:t>
+            </a:r>
+            <a:endParaRPr lang="LID4096" b="1" dirty="0">
               <a:latin typeface="Times New Roman" panose="02020603050405020304" pitchFamily="18" charset="0"/>
               <a:cs typeface="Times New Roman" panose="02020603050405020304" pitchFamily="18" charset="0"/>
             </a:endParaRPr>
           </a:p>
         </p:txBody>
       </p:sp>
-      <p:sp>
-        <p:nvSpPr>
-          <p:cNvPr id="3" name="Text Placeholder 2">
+      <p:pic>
+        <p:nvPicPr>
+          <p:cNvPr id="6" name="Content Placeholder 5" descr="Chart, bar chart&#10;&#10;Description automatically generated">
             <a:extLst>
               <a:ext uri="{FF2B5EF4-FFF2-40B4-BE49-F238E27FC236}">
-                <a16:creationId xmlns:a16="http://schemas.microsoft.com/office/drawing/2014/main" id="{7882846D-86C8-74B5-420E-93F03E16D3AF}"/>
-              </a:ext>
-            </a:extLst>
-          </p:cNvPr>
-          <p:cNvSpPr>
-            <a:spLocks noGrp="1"/>
-          </p:cNvSpPr>
-          <p:nvPr>
-            <p:ph type="body" idx="1"/>
-          </p:nvPr>
-        </p:nvSpPr>
-        <p:spPr>
-          <a:xfrm>
-            <a:off x="1295400" y="2658533"/>
-            <a:ext cx="4718304" cy="45719"/>
-          </a:xfrm>
-        </p:spPr>
-        <p:txBody>
-          <a:bodyPr/>
-          <a:lstStyle/>
-          <a:p>
-            <a:endParaRPr lang="LID4096" dirty="0"/>
-          </a:p>
-        </p:txBody>
-      </p:sp>
-      <p:sp>
-        <p:nvSpPr>
-          <p:cNvPr id="5" name="Text Placeholder 4">
-            <a:extLst>
-              <a:ext uri="{FF2B5EF4-FFF2-40B4-BE49-F238E27FC236}">
-                <a16:creationId xmlns:a16="http://schemas.microsoft.com/office/drawing/2014/main" id="{3A12F09E-E81F-AAC6-1A5D-1FFDE4D90877}"/>
-              </a:ext>
-            </a:extLst>
-          </p:cNvPr>
-          <p:cNvSpPr>
-            <a:spLocks noGrp="1"/>
-          </p:cNvSpPr>
-          <p:nvPr>
-            <p:ph type="body" sz="quarter" idx="3"/>
-          </p:nvPr>
-        </p:nvSpPr>
-        <p:spPr/>
-        <p:txBody>
-          <a:bodyPr/>
-          <a:lstStyle/>
-          <a:p>
-            <a:endParaRPr lang="LID4096" dirty="0"/>
-          </a:p>
-        </p:txBody>
-      </p:sp>
-      <p:sp>
-        <p:nvSpPr>
-          <p:cNvPr id="6" name="Content Placeholder 5">
-            <a:extLst>
-              <a:ext uri="{FF2B5EF4-FFF2-40B4-BE49-F238E27FC236}">
-                <a16:creationId xmlns:a16="http://schemas.microsoft.com/office/drawing/2014/main" id="{869AB2CE-0C68-FF0B-68A1-D549A159960F}"/>
-              </a:ext>
-            </a:extLst>
-          </p:cNvPr>
-          <p:cNvSpPr>
-            <a:spLocks noGrp="1"/>
-          </p:cNvSpPr>
-          <p:nvPr>
-            <p:ph sz="quarter" idx="4"/>
-          </p:nvPr>
-        </p:nvSpPr>
-        <p:spPr>
-          <a:xfrm>
-            <a:off x="6180670" y="2658534"/>
-            <a:ext cx="4718304" cy="3217334"/>
-          </a:xfrm>
-        </p:spPr>
-        <p:txBody>
-          <a:bodyPr>
-            <a:normAutofit/>
-          </a:bodyPr>
-          <a:lstStyle/>
-          <a:p>
-            <a:pPr marL="0" indent="0">
-              <a:buNone/>
-            </a:pPr>
-            <a:endParaRPr lang="en-US" sz="2600" dirty="0">
-              <a:latin typeface="Times New Roman" panose="02020603050405020304" pitchFamily="18" charset="0"/>
-              <a:cs typeface="Times New Roman" panose="02020603050405020304" pitchFamily="18" charset="0"/>
-            </a:endParaRPr>
-          </a:p>
-          <a:p>
-            <a:pPr marL="0" indent="0">
-              <a:buNone/>
-            </a:pPr>
-            <a:r>
-              <a:rPr lang="en-US" dirty="0">
-                <a:latin typeface="Times New Roman" panose="02020603050405020304" pitchFamily="18" charset="0"/>
-                <a:cs typeface="Times New Roman" panose="02020603050405020304" pitchFamily="18" charset="0"/>
-              </a:rPr>
-              <a:t>Movies with a combination of Action, Adventure and Sci-Fi genres are the most popular movies.</a:t>
-            </a:r>
-            <a:endParaRPr lang="LID4096" dirty="0">
-              <a:latin typeface="Times New Roman" panose="02020603050405020304" pitchFamily="18" charset="0"/>
-              <a:cs typeface="Times New Roman" panose="02020603050405020304" pitchFamily="18" charset="0"/>
-            </a:endParaRPr>
-          </a:p>
-        </p:txBody>
-      </p:sp>
-      <p:pic>
-        <p:nvPicPr>
-          <p:cNvPr id="3074" name="Picture 2">
-            <a:extLst>
-              <a:ext uri="{FF2B5EF4-FFF2-40B4-BE49-F238E27FC236}">
-                <a16:creationId xmlns:a16="http://schemas.microsoft.com/office/drawing/2014/main" id="{D028728C-DF44-5480-F025-7731CD822B7F}"/>
+                <a16:creationId xmlns:a16="http://schemas.microsoft.com/office/drawing/2014/main" id="{E7170F3C-E675-3432-70E4-6A3276AE201B}"/>
               </a:ext>
             </a:extLst>
           </p:cNvPr>
           <p:cNvPicPr>
-            <a:picLocks noGrp="1" noChangeAspect="1" noChangeArrowheads="1"/>
+            <a:picLocks noGrp="1" noChangeAspect="1"/>
           </p:cNvPicPr>
           <p:nvPr>
-            <p:ph sz="half" idx="2"/>
+            <p:ph idx="1"/>
           </p:nvPr>
         </p:nvPicPr>
         <p:blipFill>
@@ -6799,35 +6711,142 @@
               </a:ext>
             </a:extLst>
           </a:blip>
-          <a:srcRect/>
           <a:stretch>
             <a:fillRect/>
           </a:stretch>
         </p:blipFill>
-        <p:spPr bwMode="auto">
-          <a:xfrm>
-            <a:off x="1293026" y="2598577"/>
-            <a:ext cx="4637313" cy="3596950"/>
-          </a:xfrm>
-          <a:prstGeom prst="rect">
-            <a:avLst/>
-          </a:prstGeom>
-          <a:noFill/>
-          <a:extLst>
-            <a:ext uri="{909E8E84-426E-40DD-AFC4-6F175D3DCCD1}">
-              <a14:hiddenFill xmlns:a14="http://schemas.microsoft.com/office/drawing/2010/main">
-                <a:solidFill>
-                  <a:srgbClr val="FFFFFF"/>
-                </a:solidFill>
-              </a14:hiddenFill>
-            </a:ext>
-          </a:extLst>
+        <p:spPr>
+          <a:xfrm>
+            <a:off x="5418138" y="1388535"/>
+            <a:ext cx="5983582" cy="4187420"/>
+          </a:xfrm>
         </p:spPr>
       </p:pic>
+      <p:sp>
+        <p:nvSpPr>
+          <p:cNvPr id="4" name="Text Placeholder 3">
+            <a:extLst>
+              <a:ext uri="{FF2B5EF4-FFF2-40B4-BE49-F238E27FC236}">
+                <a16:creationId xmlns:a16="http://schemas.microsoft.com/office/drawing/2014/main" id="{CC31E08E-0FDF-FBE4-C795-DCE2ED0A3041}"/>
+              </a:ext>
+            </a:extLst>
+          </p:cNvPr>
+          <p:cNvSpPr>
+            <a:spLocks noGrp="1"/>
+          </p:cNvSpPr>
+          <p:nvPr>
+            <p:ph type="body" sz="half" idx="2"/>
+          </p:nvPr>
+        </p:nvSpPr>
+        <p:spPr/>
+        <p:txBody>
+          <a:bodyPr/>
+          <a:lstStyle/>
+          <a:p>
+            <a:pPr marL="0" marR="0" lvl="0" indent="0" algn="l" defTabSz="457200" rtl="0" eaLnBrk="1" fontAlgn="auto" latinLnBrk="0" hangingPunct="1">
+              <a:lnSpc>
+                <a:spcPct val="100000"/>
+              </a:lnSpc>
+              <a:spcBef>
+                <a:spcPct val="20000"/>
+              </a:spcBef>
+              <a:spcAft>
+                <a:spcPts val="600"/>
+              </a:spcAft>
+              <a:buClr>
+                <a:srgbClr val="83992A"/>
+              </a:buClr>
+              <a:buSzPct val="115000"/>
+              <a:buFont typeface="Arial"/>
+              <a:buNone/>
+              <a:tabLst/>
+              <a:defRPr/>
+            </a:pPr>
+            <a:endParaRPr kumimoji="0" lang="en-US" sz="2400" b="0" i="0" u="none" strike="noStrike" kern="1200" cap="none" spc="0" normalizeH="0" baseline="0" noProof="0" dirty="0">
+              <a:ln>
+                <a:noFill/>
+              </a:ln>
+              <a:solidFill>
+                <a:prstClr val="black">
+                  <a:lumMod val="85000"/>
+                  <a:lumOff val="15000"/>
+                </a:prstClr>
+              </a:solidFill>
+              <a:effectLst/>
+              <a:uLnTx/>
+              <a:uFillTx/>
+              <a:latin typeface="Times New Roman" panose="02020603050405020304" pitchFamily="18" charset="0"/>
+              <a:ea typeface="+mn-ea"/>
+              <a:cs typeface="Times New Roman" panose="02020603050405020304" pitchFamily="18" charset="0"/>
+            </a:endParaRPr>
+          </a:p>
+          <a:p>
+            <a:pPr marL="0" marR="0" lvl="0" indent="0" algn="l" defTabSz="457200" rtl="0" eaLnBrk="1" fontAlgn="auto" latinLnBrk="0" hangingPunct="1">
+              <a:lnSpc>
+                <a:spcPct val="100000"/>
+              </a:lnSpc>
+              <a:spcBef>
+                <a:spcPct val="20000"/>
+              </a:spcBef>
+              <a:spcAft>
+                <a:spcPts val="600"/>
+              </a:spcAft>
+              <a:buClr>
+                <a:srgbClr val="83992A"/>
+              </a:buClr>
+              <a:buSzPct val="115000"/>
+              <a:buFont typeface="Arial"/>
+              <a:buNone/>
+              <a:tabLst/>
+              <a:defRPr/>
+            </a:pPr>
+            <a:r>
+              <a:rPr kumimoji="0" lang="en-US" sz="2400" b="0" i="0" u="none" strike="noStrike" kern="1200" cap="none" spc="0" normalizeH="0" baseline="0" noProof="0" dirty="0">
+                <a:ln>
+                  <a:noFill/>
+                </a:ln>
+                <a:solidFill>
+                  <a:prstClr val="black">
+                    <a:lumMod val="85000"/>
+                    <a:lumOff val="15000"/>
+                  </a:prstClr>
+                </a:solidFill>
+                <a:effectLst/>
+                <a:uLnTx/>
+                <a:uFillTx/>
+                <a:latin typeface="Times New Roman" panose="02020603050405020304" pitchFamily="18" charset="0"/>
+                <a:ea typeface="+mn-ea"/>
+                <a:cs typeface="Times New Roman" panose="02020603050405020304" pitchFamily="18" charset="0"/>
+              </a:rPr>
+              <a:t>Movies released in June had the highest return on investment.</a:t>
+            </a:r>
+            <a:endParaRPr kumimoji="0" lang="LID4096" sz="2400" b="0" i="0" u="none" strike="noStrike" kern="1200" cap="none" spc="0" normalizeH="0" baseline="0" noProof="0" dirty="0">
+              <a:ln>
+                <a:noFill/>
+              </a:ln>
+              <a:solidFill>
+                <a:prstClr val="black">
+                  <a:lumMod val="85000"/>
+                  <a:lumOff val="15000"/>
+                </a:prstClr>
+              </a:solidFill>
+              <a:effectLst/>
+              <a:uLnTx/>
+              <a:uFillTx/>
+              <a:latin typeface="Times New Roman" panose="02020603050405020304" pitchFamily="18" charset="0"/>
+              <a:ea typeface="+mn-ea"/>
+              <a:cs typeface="Times New Roman" panose="02020603050405020304" pitchFamily="18" charset="0"/>
+            </a:endParaRPr>
+          </a:p>
+          <a:p>
+            <a:endParaRPr lang="LID4096" dirty="0"/>
+          </a:p>
+        </p:txBody>
+      </p:sp>
     </p:spTree>
     <p:extLst>
       <p:ext uri="{BB962C8B-B14F-4D97-AF65-F5344CB8AC3E}">
-        <p14:creationId xmlns:p14="http://schemas.microsoft.com/office/powerpoint/2010/main" val="1869820091"/>
+        <p14:creationId xmlns:p14="http://schemas.microsoft.com/office/powerpoint/2010/main" val="2278485024"/>
       </p:ext>
     </p:extLst>
   </p:cSld>
@@ -6859,7 +6878,7 @@
           <p:cNvPr id="2" name="Title 1">
             <a:extLst>
               <a:ext uri="{FF2B5EF4-FFF2-40B4-BE49-F238E27FC236}">
-                <a16:creationId xmlns:a16="http://schemas.microsoft.com/office/drawing/2014/main" id="{A585CBE7-E946-6D82-5B75-CC82B3F111B6}"/>
+                <a16:creationId xmlns:a16="http://schemas.microsoft.com/office/drawing/2014/main" id="{A073DEBA-E58B-ED05-9C7B-8B23657EC3EE}"/>
               </a:ext>
             </a:extLst>
           </p:cNvPr>
@@ -6875,110 +6894,12 @@
           <a:bodyPr/>
           <a:lstStyle/>
           <a:p>
-            <a:r>
-              <a:rPr lang="en-US" dirty="0"/>
-              <a:t>Return on Investment</a:t>
-            </a:r>
-            <a:endParaRPr lang="LID4096" dirty="0"/>
-          </a:p>
-        </p:txBody>
-      </p:sp>
-      <p:sp>
-        <p:nvSpPr>
-          <p:cNvPr id="3" name="Text Placeholder 2">
-            <a:extLst>
-              <a:ext uri="{FF2B5EF4-FFF2-40B4-BE49-F238E27FC236}">
-                <a16:creationId xmlns:a16="http://schemas.microsoft.com/office/drawing/2014/main" id="{D0231D5D-28C2-8A6B-D297-4F1FE51986DB}"/>
-              </a:ext>
-            </a:extLst>
-          </p:cNvPr>
-          <p:cNvSpPr>
-            <a:spLocks noGrp="1"/>
-          </p:cNvSpPr>
-          <p:nvPr>
-            <p:ph type="body" idx="1"/>
-          </p:nvPr>
-        </p:nvSpPr>
-        <p:spPr/>
-        <p:txBody>
-          <a:bodyPr/>
-          <a:lstStyle/>
-          <a:p>
-            <a:endParaRPr lang="LID4096"/>
-          </a:p>
-        </p:txBody>
-      </p:sp>
-      <p:sp>
-        <p:nvSpPr>
-          <p:cNvPr id="5" name="Text Placeholder 4">
-            <a:extLst>
-              <a:ext uri="{FF2B5EF4-FFF2-40B4-BE49-F238E27FC236}">
-                <a16:creationId xmlns:a16="http://schemas.microsoft.com/office/drawing/2014/main" id="{44FFCF28-BF89-B65A-5630-044D5212084E}"/>
-              </a:ext>
-            </a:extLst>
-          </p:cNvPr>
-          <p:cNvSpPr>
-            <a:spLocks noGrp="1"/>
-          </p:cNvSpPr>
-          <p:nvPr>
-            <p:ph type="body" sz="quarter" idx="3"/>
-          </p:nvPr>
-        </p:nvSpPr>
-        <p:spPr/>
-        <p:txBody>
-          <a:bodyPr/>
-          <a:lstStyle/>
-          <a:p>
-            <a:endParaRPr lang="LID4096" dirty="0"/>
-          </a:p>
-        </p:txBody>
-      </p:sp>
-      <p:sp>
-        <p:nvSpPr>
-          <p:cNvPr id="6" name="Content Placeholder 5">
-            <a:extLst>
-              <a:ext uri="{FF2B5EF4-FFF2-40B4-BE49-F238E27FC236}">
-                <a16:creationId xmlns:a16="http://schemas.microsoft.com/office/drawing/2014/main" id="{EA8B9681-1EB1-CD94-37D7-BBAE7404706C}"/>
-              </a:ext>
-            </a:extLst>
-          </p:cNvPr>
-          <p:cNvSpPr>
-            <a:spLocks noGrp="1"/>
-          </p:cNvSpPr>
-          <p:nvPr>
-            <p:ph sz="quarter" idx="4"/>
-          </p:nvPr>
-        </p:nvSpPr>
-        <p:spPr>
-          <a:xfrm>
-            <a:off x="6180670" y="2658534"/>
-            <a:ext cx="4718304" cy="3217334"/>
-          </a:xfrm>
-        </p:spPr>
-        <p:txBody>
-          <a:bodyPr>
-            <a:normAutofit/>
-          </a:bodyPr>
-          <a:lstStyle/>
-          <a:p>
-            <a:pPr marL="0" indent="0">
-              <a:buNone/>
-            </a:pPr>
-            <a:endParaRPr lang="en-US" dirty="0">
-              <a:latin typeface="Times New Roman" panose="02020603050405020304" pitchFamily="18" charset="0"/>
-              <a:cs typeface="Times New Roman" panose="02020603050405020304" pitchFamily="18" charset="0"/>
-            </a:endParaRPr>
-          </a:p>
-          <a:p>
-            <a:pPr marL="0" indent="0">
-              <a:buNone/>
-            </a:pPr>
             <a:r>
               <a:rPr lang="en-US" dirty="0">
                 <a:latin typeface="Times New Roman" panose="02020603050405020304" pitchFamily="18" charset="0"/>
                 <a:cs typeface="Times New Roman" panose="02020603050405020304" pitchFamily="18" charset="0"/>
               </a:rPr>
-              <a:t>Releasing movies in June would yield the highest return on investment by the movie.</a:t>
+              <a:t>Popularity of Movie Genres</a:t>
             </a:r>
             <a:endParaRPr lang="LID4096" dirty="0">
               <a:latin typeface="Times New Roman" panose="02020603050405020304" pitchFamily="18" charset="0"/>
@@ -6987,12 +6908,121 @@
           </a:p>
         </p:txBody>
       </p:sp>
+      <p:sp>
+        <p:nvSpPr>
+          <p:cNvPr id="3" name="Text Placeholder 2">
+            <a:extLst>
+              <a:ext uri="{FF2B5EF4-FFF2-40B4-BE49-F238E27FC236}">
+                <a16:creationId xmlns:a16="http://schemas.microsoft.com/office/drawing/2014/main" id="{7882846D-86C8-74B5-420E-93F03E16D3AF}"/>
+              </a:ext>
+            </a:extLst>
+          </p:cNvPr>
+          <p:cNvSpPr>
+            <a:spLocks noGrp="1"/>
+          </p:cNvSpPr>
+          <p:nvPr>
+            <p:ph type="body" idx="1"/>
+          </p:nvPr>
+        </p:nvSpPr>
+        <p:spPr>
+          <a:xfrm>
+            <a:off x="1295400" y="2658533"/>
+            <a:ext cx="4718304" cy="45719"/>
+          </a:xfrm>
+        </p:spPr>
+        <p:txBody>
+          <a:bodyPr/>
+          <a:lstStyle/>
+          <a:p>
+            <a:endParaRPr lang="LID4096" dirty="0"/>
+          </a:p>
+        </p:txBody>
+      </p:sp>
+      <p:sp>
+        <p:nvSpPr>
+          <p:cNvPr id="5" name="Text Placeholder 4">
+            <a:extLst>
+              <a:ext uri="{FF2B5EF4-FFF2-40B4-BE49-F238E27FC236}">
+                <a16:creationId xmlns:a16="http://schemas.microsoft.com/office/drawing/2014/main" id="{3A12F09E-E81F-AAC6-1A5D-1FFDE4D90877}"/>
+              </a:ext>
+            </a:extLst>
+          </p:cNvPr>
+          <p:cNvSpPr>
+            <a:spLocks noGrp="1"/>
+          </p:cNvSpPr>
+          <p:nvPr>
+            <p:ph type="body" sz="quarter" idx="3"/>
+          </p:nvPr>
+        </p:nvSpPr>
+        <p:spPr/>
+        <p:txBody>
+          <a:bodyPr/>
+          <a:lstStyle/>
+          <a:p>
+            <a:endParaRPr lang="LID4096" dirty="0"/>
+          </a:p>
+        </p:txBody>
+      </p:sp>
+      <p:sp>
+        <p:nvSpPr>
+          <p:cNvPr id="6" name="Content Placeholder 5">
+            <a:extLst>
+              <a:ext uri="{FF2B5EF4-FFF2-40B4-BE49-F238E27FC236}">
+                <a16:creationId xmlns:a16="http://schemas.microsoft.com/office/drawing/2014/main" id="{869AB2CE-0C68-FF0B-68A1-D549A159960F}"/>
+              </a:ext>
+            </a:extLst>
+          </p:cNvPr>
+          <p:cNvSpPr>
+            <a:spLocks noGrp="1"/>
+          </p:cNvSpPr>
+          <p:nvPr>
+            <p:ph sz="quarter" idx="4"/>
+          </p:nvPr>
+        </p:nvSpPr>
+        <p:spPr>
+          <a:xfrm>
+            <a:off x="6180670" y="2658534"/>
+            <a:ext cx="4718304" cy="3217334"/>
+          </a:xfrm>
+        </p:spPr>
+        <p:txBody>
+          <a:bodyPr>
+            <a:normAutofit/>
+          </a:bodyPr>
+          <a:lstStyle/>
+          <a:p>
+            <a:pPr marL="0" indent="0">
+              <a:buNone/>
+            </a:pPr>
+            <a:endParaRPr lang="en-US" sz="2600" dirty="0">
+              <a:latin typeface="Times New Roman" panose="02020603050405020304" pitchFamily="18" charset="0"/>
+              <a:cs typeface="Times New Roman" panose="02020603050405020304" pitchFamily="18" charset="0"/>
+            </a:endParaRPr>
+          </a:p>
+          <a:p>
+            <a:pPr marL="0" indent="0">
+              <a:buNone/>
+            </a:pPr>
+            <a:r>
+              <a:rPr lang="en-US" dirty="0">
+                <a:latin typeface="Times New Roman" panose="02020603050405020304" pitchFamily="18" charset="0"/>
+                <a:cs typeface="Times New Roman" panose="02020603050405020304" pitchFamily="18" charset="0"/>
+              </a:rPr>
+              <a:t>Movies with a combination of Action, Adventure and Sci-Fi genres are the most popular movies.</a:t>
+            </a:r>
+            <a:endParaRPr lang="LID4096" dirty="0">
+              <a:latin typeface="Times New Roman" panose="02020603050405020304" pitchFamily="18" charset="0"/>
+              <a:cs typeface="Times New Roman" panose="02020603050405020304" pitchFamily="18" charset="0"/>
+            </a:endParaRPr>
+          </a:p>
+        </p:txBody>
+      </p:sp>
       <p:pic>
         <p:nvPicPr>
-          <p:cNvPr id="4098" name="Picture 2">
+          <p:cNvPr id="3074" name="Picture 2">
             <a:extLst>
               <a:ext uri="{FF2B5EF4-FFF2-40B4-BE49-F238E27FC236}">
-                <a16:creationId xmlns:a16="http://schemas.microsoft.com/office/drawing/2014/main" id="{0208E192-A43F-2A26-9D4D-95359A5DB525}"/>
+                <a16:creationId xmlns:a16="http://schemas.microsoft.com/office/drawing/2014/main" id="{D028728C-DF44-5480-F025-7731CD822B7F}"/>
               </a:ext>
             </a:extLst>
           </p:cNvPr>
@@ -7018,8 +7048,8 @@
         </p:blipFill>
         <p:spPr bwMode="auto">
           <a:xfrm>
-            <a:off x="1295400" y="2658533"/>
-            <a:ext cx="4718050" cy="3289732"/>
+            <a:off x="759942" y="2428103"/>
+            <a:ext cx="5170398" cy="3767424"/>
           </a:xfrm>
           <a:prstGeom prst="rect">
             <a:avLst/>
@@ -7039,7 +7069,7 @@
     </p:spTree>
     <p:extLst>
       <p:ext uri="{BB962C8B-B14F-4D97-AF65-F5344CB8AC3E}">
-        <p14:creationId xmlns:p14="http://schemas.microsoft.com/office/powerpoint/2010/main" val="3781433793"/>
+        <p14:creationId xmlns:p14="http://schemas.microsoft.com/office/powerpoint/2010/main" val="1869820091"/>
       </p:ext>
     </p:extLst>
   </p:cSld>
@@ -7164,8 +7194,8 @@
         </p:blipFill>
         <p:spPr>
           <a:xfrm>
-            <a:off x="1293026" y="2658533"/>
-            <a:ext cx="4718304" cy="3216275"/>
+            <a:off x="766119" y="2452817"/>
+            <a:ext cx="5245211" cy="3805880"/>
           </a:xfrm>
         </p:spPr>
       </p:pic>
@@ -7243,13 +7273,8 @@
                 <a:latin typeface="Times New Roman" panose="02020603050405020304" pitchFamily="18" charset="0"/>
                 <a:cs typeface="Times New Roman" panose="02020603050405020304" pitchFamily="18" charset="0"/>
               </a:rPr>
-              <a:t>Microsoft Studios should consider partnering with BV studios as this would likely lead to the highest gross revenues from the movie.</a:t>
-            </a:r>
-          </a:p>
-          <a:p>
-            <a:pPr marL="0" indent="0">
-              <a:buNone/>
-            </a:pPr>
+              <a:t>BV Studios had the highest revenues generated by movies produced.</a:t>
+            </a:r>
             <a:endParaRPr lang="LID4096" dirty="0"/>
           </a:p>
         </p:txBody>
@@ -7268,6 +7293,213 @@
 </file>
 
 <file path=ppt/slides/slide7.xml><?xml version="1.0" encoding="utf-8"?>
+<p:sld xmlns:a="http://schemas.openxmlformats.org/drawingml/2006/main" xmlns:r="http://schemas.openxmlformats.org/officeDocument/2006/relationships" xmlns:p="http://schemas.openxmlformats.org/presentationml/2006/main">
+  <p:cSld>
+    <p:spTree>
+      <p:nvGrpSpPr>
+        <p:cNvPr id="1" name=""/>
+        <p:cNvGrpSpPr/>
+        <p:nvPr/>
+      </p:nvGrpSpPr>
+      <p:grpSpPr>
+        <a:xfrm>
+          <a:off x="0" y="0"/>
+          <a:ext cx="0" cy="0"/>
+          <a:chOff x="0" y="0"/>
+          <a:chExt cx="0" cy="0"/>
+        </a:xfrm>
+      </p:grpSpPr>
+      <p:sp>
+        <p:nvSpPr>
+          <p:cNvPr id="2" name="Title 1">
+            <a:extLst>
+              <a:ext uri="{FF2B5EF4-FFF2-40B4-BE49-F238E27FC236}">
+                <a16:creationId xmlns:a16="http://schemas.microsoft.com/office/drawing/2014/main" id="{144787EB-4AD5-C886-AB1D-5CC0D78331D9}"/>
+              </a:ext>
+            </a:extLst>
+          </p:cNvPr>
+          <p:cNvSpPr>
+            <a:spLocks noGrp="1"/>
+          </p:cNvSpPr>
+          <p:nvPr>
+            <p:ph type="title"/>
+          </p:nvPr>
+        </p:nvSpPr>
+        <p:spPr/>
+        <p:txBody>
+          <a:bodyPr>
+            <a:normAutofit fontScale="90000"/>
+          </a:bodyPr>
+          <a:lstStyle/>
+          <a:p>
+            <a:r>
+              <a:rPr lang="en-US" dirty="0">
+                <a:latin typeface="Times New Roman" panose="02020603050405020304" pitchFamily="18" charset="0"/>
+                <a:cs typeface="Times New Roman" panose="02020603050405020304" pitchFamily="18" charset="0"/>
+              </a:rPr>
+              <a:t>Relationship between Production Budget and Gross Revenue</a:t>
+            </a:r>
+            <a:endParaRPr lang="LID4096" dirty="0">
+              <a:latin typeface="Times New Roman" panose="02020603050405020304" pitchFamily="18" charset="0"/>
+              <a:cs typeface="Times New Roman" panose="02020603050405020304" pitchFamily="18" charset="0"/>
+            </a:endParaRPr>
+          </a:p>
+        </p:txBody>
+      </p:sp>
+      <p:sp>
+        <p:nvSpPr>
+          <p:cNvPr id="3" name="Text Placeholder 2">
+            <a:extLst>
+              <a:ext uri="{FF2B5EF4-FFF2-40B4-BE49-F238E27FC236}">
+                <a16:creationId xmlns:a16="http://schemas.microsoft.com/office/drawing/2014/main" id="{61A26C05-CD2D-08F3-DCBE-ABD7ACDAF0EF}"/>
+              </a:ext>
+            </a:extLst>
+          </p:cNvPr>
+          <p:cNvSpPr>
+            <a:spLocks noGrp="1"/>
+          </p:cNvSpPr>
+          <p:nvPr>
+            <p:ph type="body" idx="1"/>
+          </p:nvPr>
+        </p:nvSpPr>
+        <p:spPr/>
+        <p:txBody>
+          <a:bodyPr/>
+          <a:lstStyle/>
+          <a:p>
+            <a:endParaRPr lang="LID4096"/>
+          </a:p>
+        </p:txBody>
+      </p:sp>
+      <p:pic>
+        <p:nvPicPr>
+          <p:cNvPr id="8" name="Content Placeholder 7" descr="Chart, scatter chart&#10;&#10;Description automatically generated">
+            <a:extLst>
+              <a:ext uri="{FF2B5EF4-FFF2-40B4-BE49-F238E27FC236}">
+                <a16:creationId xmlns:a16="http://schemas.microsoft.com/office/drawing/2014/main" id="{68247B0E-79B8-16CD-CDF3-6D1D53EE2F0E}"/>
+              </a:ext>
+            </a:extLst>
+          </p:cNvPr>
+          <p:cNvPicPr>
+            <a:picLocks noGrp="1" noChangeAspect="1"/>
+          </p:cNvPicPr>
+          <p:nvPr>
+            <p:ph sz="half" idx="2"/>
+          </p:nvPr>
+        </p:nvPicPr>
+        <p:blipFill>
+          <a:blip r:embed="rId2">
+            <a:extLst>
+              <a:ext uri="{28A0092B-C50C-407E-A947-70E740481C1C}">
+                <a14:useLocalDpi xmlns:a14="http://schemas.microsoft.com/office/drawing/2010/main" val="0"/>
+              </a:ext>
+            </a:extLst>
+          </a:blip>
+          <a:stretch>
+            <a:fillRect/>
+          </a:stretch>
+        </p:blipFill>
+        <p:spPr>
+          <a:xfrm>
+            <a:off x="804041" y="2658534"/>
+            <a:ext cx="5209409" cy="3513666"/>
+          </a:xfrm>
+        </p:spPr>
+      </p:pic>
+      <p:sp>
+        <p:nvSpPr>
+          <p:cNvPr id="5" name="Text Placeholder 4">
+            <a:extLst>
+              <a:ext uri="{FF2B5EF4-FFF2-40B4-BE49-F238E27FC236}">
+                <a16:creationId xmlns:a16="http://schemas.microsoft.com/office/drawing/2014/main" id="{E8DF5648-C772-0643-D79A-E46C885D811E}"/>
+              </a:ext>
+            </a:extLst>
+          </p:cNvPr>
+          <p:cNvSpPr>
+            <a:spLocks noGrp="1"/>
+          </p:cNvSpPr>
+          <p:nvPr>
+            <p:ph type="body" sz="quarter" idx="3"/>
+          </p:nvPr>
+        </p:nvSpPr>
+        <p:spPr/>
+        <p:txBody>
+          <a:bodyPr/>
+          <a:lstStyle/>
+          <a:p>
+            <a:endParaRPr lang="LID4096"/>
+          </a:p>
+        </p:txBody>
+      </p:sp>
+      <p:sp>
+        <p:nvSpPr>
+          <p:cNvPr id="6" name="Content Placeholder 5">
+            <a:extLst>
+              <a:ext uri="{FF2B5EF4-FFF2-40B4-BE49-F238E27FC236}">
+                <a16:creationId xmlns:a16="http://schemas.microsoft.com/office/drawing/2014/main" id="{00ACEADA-7600-60D5-66E8-218F72BF3250}"/>
+              </a:ext>
+            </a:extLst>
+          </p:cNvPr>
+          <p:cNvSpPr>
+            <a:spLocks noGrp="1"/>
+          </p:cNvSpPr>
+          <p:nvPr>
+            <p:ph sz="quarter" idx="4"/>
+          </p:nvPr>
+        </p:nvSpPr>
+        <p:spPr>
+          <a:xfrm>
+            <a:off x="6180670" y="2658534"/>
+            <a:ext cx="4718304" cy="3217334"/>
+          </a:xfrm>
+        </p:spPr>
+        <p:txBody>
+          <a:bodyPr/>
+          <a:lstStyle/>
+          <a:p>
+            <a:pPr marL="0" indent="0">
+              <a:buNone/>
+            </a:pPr>
+            <a:endParaRPr lang="en-US" dirty="0"/>
+          </a:p>
+          <a:p>
+            <a:pPr marL="0" indent="0">
+              <a:buNone/>
+            </a:pPr>
+            <a:endParaRPr lang="en-US" dirty="0"/>
+          </a:p>
+          <a:p>
+            <a:pPr marL="0" indent="0">
+              <a:buNone/>
+            </a:pPr>
+            <a:r>
+              <a:rPr lang="en-US" dirty="0">
+                <a:latin typeface="Times New Roman" panose="02020603050405020304" pitchFamily="18" charset="0"/>
+                <a:cs typeface="Times New Roman" panose="02020603050405020304" pitchFamily="18" charset="0"/>
+              </a:rPr>
+              <a:t>A higher production budget results in higher worldwide gross revenue.</a:t>
+            </a:r>
+            <a:endParaRPr lang="LID4096" dirty="0">
+              <a:latin typeface="Times New Roman" panose="02020603050405020304" pitchFamily="18" charset="0"/>
+              <a:cs typeface="Times New Roman" panose="02020603050405020304" pitchFamily="18" charset="0"/>
+            </a:endParaRPr>
+          </a:p>
+        </p:txBody>
+      </p:sp>
+    </p:spTree>
+    <p:extLst>
+      <p:ext uri="{BB962C8B-B14F-4D97-AF65-F5344CB8AC3E}">
+        <p14:creationId xmlns:p14="http://schemas.microsoft.com/office/powerpoint/2010/main" val="3617416592"/>
+      </p:ext>
+    </p:extLst>
+  </p:cSld>
+  <p:clrMapOvr>
+    <a:masterClrMapping/>
+  </p:clrMapOvr>
+</p:sld>
+</file>
+
+<file path=ppt/slides/slide8.xml><?xml version="1.0" encoding="utf-8"?>
 <p:sld xmlns:a="http://schemas.openxmlformats.org/drawingml/2006/main" xmlns:r="http://schemas.openxmlformats.org/officeDocument/2006/relationships" xmlns:p="http://schemas.openxmlformats.org/presentationml/2006/main">
   <p:cSld>
     <p:bg>
@@ -7688,6 +7920,13 @@
               <a:defRPr/>
             </a:pPr>
             <a:r>
+              <a:rPr lang="en-US" dirty="0">
+                <a:latin typeface="Times New Roman" panose="02020603050405020304" pitchFamily="18" charset="0"/>
+                <a:cs typeface="Times New Roman" panose="02020603050405020304" pitchFamily="18" charset="0"/>
+              </a:rPr>
+              <a:t>Microsoft should release</a:t>
+            </a:r>
+            <a:r>
               <a:rPr kumimoji="0" lang="en-US" b="0" i="0" u="none" strike="noStrike" kern="1200" cap="none" spc="0" normalizeH="0" baseline="0" noProof="0" dirty="0">
                 <a:ln>
                   <a:noFill/>
@@ -7698,7 +7937,27 @@
                 <a:latin typeface="Times New Roman" panose="02020603050405020304" pitchFamily="18" charset="0"/>
                 <a:cs typeface="Times New Roman" panose="02020603050405020304" pitchFamily="18" charset="0"/>
               </a:rPr>
-              <a:t>Releasing movies in December would likely lead to the highest return on investment by the movie.</a:t>
+              <a:t> movies in </a:t>
+            </a:r>
+            <a:r>
+              <a:rPr lang="en-US" dirty="0">
+                <a:latin typeface="Times New Roman" panose="02020603050405020304" pitchFamily="18" charset="0"/>
+                <a:cs typeface="Times New Roman" panose="02020603050405020304" pitchFamily="18" charset="0"/>
+              </a:rPr>
+              <a:t>June, to generate the </a:t>
+            </a:r>
+            <a:r>
+              <a:rPr kumimoji="0" lang="en-US" b="0" i="0" u="none" strike="noStrike" kern="1200" cap="none" spc="0" normalizeH="0" baseline="0" noProof="0" dirty="0">
+                <a:ln>
+                  <a:noFill/>
+                </a:ln>
+                <a:effectLst/>
+                <a:uLnTx/>
+                <a:uFillTx/>
+                <a:latin typeface="Times New Roman" panose="02020603050405020304" pitchFamily="18" charset="0"/>
+                <a:cs typeface="Times New Roman" panose="02020603050405020304" pitchFamily="18" charset="0"/>
+              </a:rPr>
+              <a:t>highest return on investment.</a:t>
             </a:r>
             <a:endParaRPr lang="en-US" dirty="0">
               <a:latin typeface="Times New Roman" panose="02020603050405020304" pitchFamily="18" charset="0"/>
@@ -7732,7 +7991,7 @@
 </p:sld>
 </file>
 
-<file path=ppt/slides/slide8.xml><?xml version="1.0" encoding="utf-8"?>
+<file path=ppt/slides/slide9.xml><?xml version="1.0" encoding="utf-8"?>
 <p:sld xmlns:a="http://schemas.openxmlformats.org/drawingml/2006/main" xmlns:r="http://schemas.openxmlformats.org/officeDocument/2006/relationships" xmlns:p="http://schemas.openxmlformats.org/presentationml/2006/main">
   <p:cSld>
     <p:bg>
@@ -8288,8 +8547,8 @@
         </p:nvSpPr>
         <p:spPr>
           <a:xfrm>
-            <a:off x="2692398" y="3657597"/>
-            <a:ext cx="6815669" cy="1320802"/>
+            <a:off x="2692398" y="3657596"/>
+            <a:ext cx="6815669" cy="1588377"/>
           </a:xfrm>
         </p:spPr>
         <p:txBody>
@@ -8299,7 +8558,7 @@
           <a:lstStyle/>
           <a:p>
             <a:r>
-              <a:rPr lang="en-US" sz="2800" dirty="0">
+              <a:rPr lang="en-US" sz="2400" dirty="0">
                 <a:solidFill>
                   <a:schemeClr val="bg1"/>
                 </a:solidFill>
@@ -8308,6 +8567,20 @@
               </a:rPr>
               <a:t>Samwel Kagwi</a:t>
             </a:r>
+          </a:p>
+          <a:p>
+            <a:r>
+              <a:rPr lang="en-US" sz="2400" dirty="0">
+                <a:solidFill>
+                  <a:schemeClr val="bg1"/>
+                </a:solidFill>
+                <a:latin typeface="Times New Roman" panose="02020603050405020304" pitchFamily="18" charset="0"/>
+                <a:cs typeface="Times New Roman" panose="02020603050405020304" pitchFamily="18" charset="0"/>
+              </a:rPr>
+              <a:t>GitHub: https://github.com/S-Kagwi/dsc-phase-1-project-v2-4.git</a:t>
+            </a:r>
+          </a:p>
+          <a:p>
             <a:endParaRPr lang="LID4096" sz="2800" dirty="0">
               <a:solidFill>
                 <a:schemeClr val="bg1"/>

</xml_diff>